<commit_message>
new bioconda packages webpage added
</commit_message>
<xml_diff>
--- a/cluster_course/powerpoint/7_Conda.pptx
+++ b/cluster_course/powerpoint/7_Conda.pptx
@@ -9,18 +9,20 @@
     <p:sldId id="330" r:id="rId3"/>
     <p:sldId id="329" r:id="rId4"/>
     <p:sldId id="291" r:id="rId5"/>
-    <p:sldId id="292" r:id="rId6"/>
-    <p:sldId id="293" r:id="rId7"/>
-    <p:sldId id="294" r:id="rId8"/>
-    <p:sldId id="295" r:id="rId9"/>
-    <p:sldId id="296" r:id="rId10"/>
-    <p:sldId id="332" r:id="rId11"/>
-    <p:sldId id="298" r:id="rId12"/>
-    <p:sldId id="299" r:id="rId13"/>
-    <p:sldId id="297" r:id="rId14"/>
-    <p:sldId id="331" r:id="rId15"/>
-    <p:sldId id="328" r:id="rId16"/>
-    <p:sldId id="278" r:id="rId17"/>
+    <p:sldId id="333" r:id="rId6"/>
+    <p:sldId id="292" r:id="rId7"/>
+    <p:sldId id="293" r:id="rId8"/>
+    <p:sldId id="294" r:id="rId9"/>
+    <p:sldId id="295" r:id="rId10"/>
+    <p:sldId id="296" r:id="rId11"/>
+    <p:sldId id="332" r:id="rId12"/>
+    <p:sldId id="298" r:id="rId13"/>
+    <p:sldId id="299" r:id="rId14"/>
+    <p:sldId id="297" r:id="rId15"/>
+    <p:sldId id="334" r:id="rId16"/>
+    <p:sldId id="331" r:id="rId17"/>
+    <p:sldId id="328" r:id="rId18"/>
+    <p:sldId id="278" r:id="rId19"/>
   </p:sldIdLst>
   <p:sldSz cx="12192000" cy="6858000"/>
   <p:notesSz cx="6858000" cy="9144000"/>
@@ -276,7 +278,7 @@
           <a:p>
             <a:fld id="{B1339DB0-78C2-4D45-927F-4D346157740C}" type="datetimeFigureOut">
               <a:rPr lang="en-GB" smtClean="0"/>
-              <a:t>21/11/2018</a:t>
+              <a:t>14/02/2019</a:t>
             </a:fld>
             <a:endParaRPr lang="en-GB"/>
           </a:p>
@@ -476,7 +478,7 @@
           <a:p>
             <a:fld id="{B1339DB0-78C2-4D45-927F-4D346157740C}" type="datetimeFigureOut">
               <a:rPr lang="en-GB" smtClean="0"/>
-              <a:t>21/11/2018</a:t>
+              <a:t>14/02/2019</a:t>
             </a:fld>
             <a:endParaRPr lang="en-GB"/>
           </a:p>
@@ -686,7 +688,7 @@
           <a:p>
             <a:fld id="{B1339DB0-78C2-4D45-927F-4D346157740C}" type="datetimeFigureOut">
               <a:rPr lang="en-GB" smtClean="0"/>
-              <a:t>21/11/2018</a:t>
+              <a:t>14/02/2019</a:t>
             </a:fld>
             <a:endParaRPr lang="en-GB"/>
           </a:p>
@@ -886,7 +888,7 @@
           <a:p>
             <a:fld id="{B1339DB0-78C2-4D45-927F-4D346157740C}" type="datetimeFigureOut">
               <a:rPr lang="en-GB" smtClean="0"/>
-              <a:t>21/11/2018</a:t>
+              <a:t>14/02/2019</a:t>
             </a:fld>
             <a:endParaRPr lang="en-GB"/>
           </a:p>
@@ -1162,7 +1164,7 @@
           <a:p>
             <a:fld id="{B1339DB0-78C2-4D45-927F-4D346157740C}" type="datetimeFigureOut">
               <a:rPr lang="en-GB" smtClean="0"/>
-              <a:t>21/11/2018</a:t>
+              <a:t>14/02/2019</a:t>
             </a:fld>
             <a:endParaRPr lang="en-GB"/>
           </a:p>
@@ -1430,7 +1432,7 @@
           <a:p>
             <a:fld id="{B1339DB0-78C2-4D45-927F-4D346157740C}" type="datetimeFigureOut">
               <a:rPr lang="en-GB" smtClean="0"/>
-              <a:t>21/11/2018</a:t>
+              <a:t>14/02/2019</a:t>
             </a:fld>
             <a:endParaRPr lang="en-GB"/>
           </a:p>
@@ -1845,7 +1847,7 @@
           <a:p>
             <a:fld id="{B1339DB0-78C2-4D45-927F-4D346157740C}" type="datetimeFigureOut">
               <a:rPr lang="en-GB" smtClean="0"/>
-              <a:t>21/11/2018</a:t>
+              <a:t>14/02/2019</a:t>
             </a:fld>
             <a:endParaRPr lang="en-GB"/>
           </a:p>
@@ -1987,7 +1989,7 @@
           <a:p>
             <a:fld id="{B1339DB0-78C2-4D45-927F-4D346157740C}" type="datetimeFigureOut">
               <a:rPr lang="en-GB" smtClean="0"/>
-              <a:t>21/11/2018</a:t>
+              <a:t>14/02/2019</a:t>
             </a:fld>
             <a:endParaRPr lang="en-GB"/>
           </a:p>
@@ -2100,7 +2102,7 @@
           <a:p>
             <a:fld id="{B1339DB0-78C2-4D45-927F-4D346157740C}" type="datetimeFigureOut">
               <a:rPr lang="en-GB" smtClean="0"/>
-              <a:t>21/11/2018</a:t>
+              <a:t>14/02/2019</a:t>
             </a:fld>
             <a:endParaRPr lang="en-GB"/>
           </a:p>
@@ -2413,7 +2415,7 @@
           <a:p>
             <a:fld id="{B1339DB0-78C2-4D45-927F-4D346157740C}" type="datetimeFigureOut">
               <a:rPr lang="en-GB" smtClean="0"/>
-              <a:t>21/11/2018</a:t>
+              <a:t>14/02/2019</a:t>
             </a:fld>
             <a:endParaRPr lang="en-GB"/>
           </a:p>
@@ -2702,7 +2704,7 @@
           <a:p>
             <a:fld id="{B1339DB0-78C2-4D45-927F-4D346157740C}" type="datetimeFigureOut">
               <a:rPr lang="en-GB" smtClean="0"/>
-              <a:t>21/11/2018</a:t>
+              <a:t>14/02/2019</a:t>
             </a:fld>
             <a:endParaRPr lang="en-GB"/>
           </a:p>
@@ -2945,7 +2947,7 @@
           <a:p>
             <a:fld id="{B1339DB0-78C2-4D45-927F-4D346157740C}" type="datetimeFigureOut">
               <a:rPr lang="en-GB" smtClean="0"/>
-              <a:t>21/11/2018</a:t>
+              <a:t>14/02/2019</a:t>
             </a:fld>
             <a:endParaRPr lang="en-GB"/>
           </a:p>
@@ -3465,6 +3467,277 @@
                   <a:srgbClr val="7030A0"/>
                 </a:solidFill>
               </a:rPr>
+              <a:t>7) Conda: installing in an “</a:t>
+            </a:r>
+            <a:r>
+              <a:rPr lang="en-GB" dirty="0" err="1">
+                <a:solidFill>
+                  <a:srgbClr val="7030A0"/>
+                </a:solidFill>
+              </a:rPr>
+              <a:t>env</a:t>
+            </a:r>
+            <a:r>
+              <a:rPr lang="en-GB" dirty="0">
+                <a:solidFill>
+                  <a:srgbClr val="7030A0"/>
+                </a:solidFill>
+              </a:rPr>
+              <a:t>”</a:t>
+            </a:r>
+          </a:p>
+        </p:txBody>
+      </p:sp>
+      <p:sp>
+        <p:nvSpPr>
+          <p:cNvPr id="3" name="Content Placeholder 2">
+            <a:extLst>
+              <a:ext uri="{FF2B5EF4-FFF2-40B4-BE49-F238E27FC236}">
+                <a16:creationId xmlns:a16="http://schemas.microsoft.com/office/drawing/2014/main" id="{EBD8A9F9-A616-4F33-9309-8311F95B6F9F}"/>
+              </a:ext>
+            </a:extLst>
+          </p:cNvPr>
+          <p:cNvSpPr>
+            <a:spLocks noGrp="1"/>
+          </p:cNvSpPr>
+          <p:nvPr>
+            <p:ph idx="1"/>
+          </p:nvPr>
+        </p:nvSpPr>
+        <p:spPr>
+          <a:xfrm>
+            <a:off x="152400" y="758031"/>
+            <a:ext cx="11506200" cy="4351338"/>
+          </a:xfrm>
+        </p:spPr>
+        <p:txBody>
+          <a:bodyPr>
+            <a:normAutofit/>
+          </a:bodyPr>
+          <a:lstStyle/>
+          <a:p>
+            <a:pPr marL="0" indent="0">
+              <a:buNone/>
+            </a:pPr>
+            <a:endParaRPr lang="en-GB" dirty="0">
+              <a:solidFill>
+                <a:srgbClr val="0070C0"/>
+              </a:solidFill>
+            </a:endParaRPr>
+          </a:p>
+          <a:p>
+            <a:pPr marL="0" indent="0">
+              <a:buNone/>
+            </a:pPr>
+            <a:r>
+              <a:rPr lang="en-GB" dirty="0" err="1">
+                <a:solidFill>
+                  <a:srgbClr val="0070C0"/>
+                </a:solidFill>
+              </a:rPr>
+              <a:t>conda</a:t>
+            </a:r>
+            <a:r>
+              <a:rPr lang="en-GB" dirty="0">
+                <a:solidFill>
+                  <a:srgbClr val="0070C0"/>
+                </a:solidFill>
+              </a:rPr>
+              <a:t> activate trinity     </a:t>
+            </a:r>
+            <a:r>
+              <a:rPr lang="en-GB" dirty="0"/>
+              <a:t>(you have to activate it to use it)</a:t>
+            </a:r>
+          </a:p>
+          <a:p>
+            <a:pPr marL="0" indent="0">
+              <a:buNone/>
+            </a:pPr>
+            <a:endParaRPr lang="en-GB" dirty="0"/>
+          </a:p>
+          <a:p>
+            <a:pPr marL="0" indent="0">
+              <a:buNone/>
+            </a:pPr>
+            <a:endParaRPr lang="en-GB" dirty="0">
+              <a:solidFill>
+                <a:srgbClr val="0070C0"/>
+              </a:solidFill>
+            </a:endParaRPr>
+          </a:p>
+          <a:p>
+            <a:pPr marL="0" indent="0">
+              <a:buNone/>
+            </a:pPr>
+            <a:r>
+              <a:rPr lang="en-GB" dirty="0"/>
+              <a:t>Name of </a:t>
+            </a:r>
+            <a:r>
+              <a:rPr lang="en-GB" dirty="0" err="1"/>
+              <a:t>env</a:t>
+            </a:r>
+            <a:endParaRPr lang="en-GB" dirty="0"/>
+          </a:p>
+          <a:p>
+            <a:pPr marL="0" indent="0">
+              <a:buNone/>
+            </a:pPr>
+            <a:endParaRPr lang="en-GB" dirty="0">
+              <a:solidFill>
+                <a:srgbClr val="0070C0"/>
+              </a:solidFill>
+            </a:endParaRPr>
+          </a:p>
+          <a:p>
+            <a:endParaRPr lang="en-GB" dirty="0">
+              <a:solidFill>
+                <a:srgbClr val="0070C0"/>
+              </a:solidFill>
+            </a:endParaRPr>
+          </a:p>
+        </p:txBody>
+      </p:sp>
+      <p:pic>
+        <p:nvPicPr>
+          <p:cNvPr id="4" name="Picture 3">
+            <a:extLst>
+              <a:ext uri="{FF2B5EF4-FFF2-40B4-BE49-F238E27FC236}">
+                <a16:creationId xmlns:a16="http://schemas.microsoft.com/office/drawing/2014/main" id="{92B58DEE-428B-4524-9A99-56C6F7ECD658}"/>
+              </a:ext>
+            </a:extLst>
+          </p:cNvPr>
+          <p:cNvPicPr>
+            <a:picLocks noChangeAspect="1"/>
+          </p:cNvPicPr>
+          <p:nvPr/>
+        </p:nvPicPr>
+        <p:blipFill rotWithShape="1">
+          <a:blip r:embed="rId2">
+            <a:extLst>
+              <a:ext uri="{28A0092B-C50C-407E-A947-70E740481C1C}">
+                <a14:useLocalDpi xmlns:a14="http://schemas.microsoft.com/office/drawing/2010/main" val="0"/>
+              </a:ext>
+            </a:extLst>
+          </a:blip>
+          <a:srcRect/>
+          <a:stretch/>
+        </p:blipFill>
+        <p:spPr>
+          <a:xfrm>
+            <a:off x="2209800" y="1760513"/>
+            <a:ext cx="8128000" cy="5008587"/>
+          </a:xfrm>
+          <a:prstGeom prst="rect">
+            <a:avLst/>
+          </a:prstGeom>
+        </p:spPr>
+      </p:pic>
+      <p:cxnSp>
+        <p:nvCxnSpPr>
+          <p:cNvPr id="6" name="Straight Arrow Connector 5">
+            <a:extLst>
+              <a:ext uri="{FF2B5EF4-FFF2-40B4-BE49-F238E27FC236}">
+                <a16:creationId xmlns:a16="http://schemas.microsoft.com/office/drawing/2014/main" id="{178E06DB-54B0-46A3-8CFC-39CAAD99C7BE}"/>
+              </a:ext>
+            </a:extLst>
+          </p:cNvPr>
+          <p:cNvCxnSpPr>
+            <a:cxnSpLocks/>
+          </p:cNvCxnSpPr>
+          <p:nvPr/>
+        </p:nvCxnSpPr>
+        <p:spPr>
+          <a:xfrm flipV="1">
+            <a:off x="1143000" y="2479278"/>
+            <a:ext cx="965200" cy="419100"/>
+          </a:xfrm>
+          <a:prstGeom prst="straightConnector1">
+            <a:avLst/>
+          </a:prstGeom>
+          <a:ln>
+            <a:tailEnd type="triangle"/>
+          </a:ln>
+        </p:spPr>
+        <p:style>
+          <a:lnRef idx="3">
+            <a:schemeClr val="accent1"/>
+          </a:lnRef>
+          <a:fillRef idx="0">
+            <a:schemeClr val="accent1"/>
+          </a:fillRef>
+          <a:effectRef idx="2">
+            <a:schemeClr val="accent1"/>
+          </a:effectRef>
+          <a:fontRef idx="minor">
+            <a:schemeClr val="tx1"/>
+          </a:fontRef>
+        </p:style>
+      </p:cxnSp>
+    </p:spTree>
+    <p:extLst>
+      <p:ext uri="{BB962C8B-B14F-4D97-AF65-F5344CB8AC3E}">
+        <p14:creationId xmlns:p14="http://schemas.microsoft.com/office/powerpoint/2010/main" val="1326123334"/>
+      </p:ext>
+    </p:extLst>
+  </p:cSld>
+  <p:clrMapOvr>
+    <a:masterClrMapping/>
+  </p:clrMapOvr>
+</p:sld>
+</file>
+
+<file path=ppt/slides/slide11.xml><?xml version="1.0" encoding="utf-8"?>
+<p:sld xmlns:a="http://schemas.openxmlformats.org/drawingml/2006/main" xmlns:r="http://schemas.openxmlformats.org/officeDocument/2006/relationships" xmlns:p="http://schemas.openxmlformats.org/presentationml/2006/main">
+  <p:cSld>
+    <p:spTree>
+      <p:nvGrpSpPr>
+        <p:cNvPr id="1" name=""/>
+        <p:cNvGrpSpPr/>
+        <p:nvPr/>
+      </p:nvGrpSpPr>
+      <p:grpSpPr>
+        <a:xfrm>
+          <a:off x="0" y="0"/>
+          <a:ext cx="0" cy="0"/>
+          <a:chOff x="0" y="0"/>
+          <a:chExt cx="0" cy="0"/>
+        </a:xfrm>
+      </p:grpSpPr>
+      <p:sp>
+        <p:nvSpPr>
+          <p:cNvPr id="2" name="Title 1">
+            <a:extLst>
+              <a:ext uri="{FF2B5EF4-FFF2-40B4-BE49-F238E27FC236}">
+                <a16:creationId xmlns:a16="http://schemas.microsoft.com/office/drawing/2014/main" id="{E0E33078-4396-4F2D-9BCD-FF8FF704BF20}"/>
+              </a:ext>
+            </a:extLst>
+          </p:cNvPr>
+          <p:cNvSpPr>
+            <a:spLocks noGrp="1"/>
+          </p:cNvSpPr>
+          <p:nvPr>
+            <p:ph type="title"/>
+          </p:nvPr>
+        </p:nvSpPr>
+        <p:spPr>
+          <a:xfrm>
+            <a:off x="838200" y="-219075"/>
+            <a:ext cx="10515600" cy="1325563"/>
+          </a:xfrm>
+        </p:spPr>
+        <p:txBody>
+          <a:bodyPr/>
+          <a:lstStyle/>
+          <a:p>
+            <a:pPr algn="ctr"/>
+            <a:r>
+              <a:rPr lang="en-GB" dirty="0">
+                <a:solidFill>
+                  <a:srgbClr val="7030A0"/>
+                </a:solidFill>
+              </a:rPr>
               <a:t>7) Conda: list program install in the “</a:t>
             </a:r>
             <a:r>
@@ -3698,242 +3971,6 @@
 </p:sld>
 </file>
 
-<file path=ppt/slides/slide11.xml><?xml version="1.0" encoding="utf-8"?>
-<p:sld xmlns:a="http://schemas.openxmlformats.org/drawingml/2006/main" xmlns:r="http://schemas.openxmlformats.org/officeDocument/2006/relationships" xmlns:p="http://schemas.openxmlformats.org/presentationml/2006/main">
-  <p:cSld>
-    <p:spTree>
-      <p:nvGrpSpPr>
-        <p:cNvPr id="1" name=""/>
-        <p:cNvGrpSpPr/>
-        <p:nvPr/>
-      </p:nvGrpSpPr>
-      <p:grpSpPr>
-        <a:xfrm>
-          <a:off x="0" y="0"/>
-          <a:ext cx="0" cy="0"/>
-          <a:chOff x="0" y="0"/>
-          <a:chExt cx="0" cy="0"/>
-        </a:xfrm>
-      </p:grpSpPr>
-      <p:sp>
-        <p:nvSpPr>
-          <p:cNvPr id="2" name="Title 1">
-            <a:extLst>
-              <a:ext uri="{FF2B5EF4-FFF2-40B4-BE49-F238E27FC236}">
-                <a16:creationId xmlns:a16="http://schemas.microsoft.com/office/drawing/2014/main" id="{E0E33078-4396-4F2D-9BCD-FF8FF704BF20}"/>
-              </a:ext>
-            </a:extLst>
-          </p:cNvPr>
-          <p:cNvSpPr>
-            <a:spLocks noGrp="1"/>
-          </p:cNvSpPr>
-          <p:nvPr>
-            <p:ph type="title"/>
-          </p:nvPr>
-        </p:nvSpPr>
-        <p:spPr>
-          <a:xfrm>
-            <a:off x="838200" y="-219075"/>
-            <a:ext cx="10515600" cy="1325563"/>
-          </a:xfrm>
-        </p:spPr>
-        <p:txBody>
-          <a:bodyPr/>
-          <a:lstStyle/>
-          <a:p>
-            <a:r>
-              <a:rPr lang="en-GB" dirty="0">
-                <a:solidFill>
-                  <a:srgbClr val="7030A0"/>
-                </a:solidFill>
-              </a:rPr>
-              <a:t>7) Conda: installing in an “</a:t>
-            </a:r>
-            <a:r>
-              <a:rPr lang="en-GB" dirty="0" err="1">
-                <a:solidFill>
-                  <a:srgbClr val="7030A0"/>
-                </a:solidFill>
-              </a:rPr>
-              <a:t>env</a:t>
-            </a:r>
-            <a:r>
-              <a:rPr lang="en-GB" dirty="0">
-                <a:solidFill>
-                  <a:srgbClr val="7030A0"/>
-                </a:solidFill>
-              </a:rPr>
-              <a:t>”</a:t>
-            </a:r>
-          </a:p>
-        </p:txBody>
-      </p:sp>
-      <p:sp>
-        <p:nvSpPr>
-          <p:cNvPr id="3" name="Content Placeholder 2">
-            <a:extLst>
-              <a:ext uri="{FF2B5EF4-FFF2-40B4-BE49-F238E27FC236}">
-                <a16:creationId xmlns:a16="http://schemas.microsoft.com/office/drawing/2014/main" id="{EBD8A9F9-A616-4F33-9309-8311F95B6F9F}"/>
-              </a:ext>
-            </a:extLst>
-          </p:cNvPr>
-          <p:cNvSpPr>
-            <a:spLocks noGrp="1"/>
-          </p:cNvSpPr>
-          <p:nvPr>
-            <p:ph idx="1"/>
-          </p:nvPr>
-        </p:nvSpPr>
-        <p:spPr>
-          <a:xfrm>
-            <a:off x="254000" y="1253331"/>
-            <a:ext cx="11506200" cy="4351338"/>
-          </a:xfrm>
-        </p:spPr>
-        <p:txBody>
-          <a:bodyPr>
-            <a:normAutofit/>
-          </a:bodyPr>
-          <a:lstStyle/>
-          <a:p>
-            <a:pPr marL="0" indent="0">
-              <a:buNone/>
-            </a:pPr>
-            <a:endParaRPr lang="en-GB" dirty="0">
-              <a:solidFill>
-                <a:srgbClr val="0070C0"/>
-              </a:solidFill>
-            </a:endParaRPr>
-          </a:p>
-          <a:p>
-            <a:pPr marL="0" indent="0">
-              <a:buNone/>
-            </a:pPr>
-            <a:r>
-              <a:rPr lang="en-GB" dirty="0" err="1">
-                <a:solidFill>
-                  <a:srgbClr val="0070C0"/>
-                </a:solidFill>
-              </a:rPr>
-              <a:t>conda</a:t>
-            </a:r>
-            <a:r>
-              <a:rPr lang="en-GB" dirty="0">
-                <a:solidFill>
-                  <a:srgbClr val="0070C0"/>
-                </a:solidFill>
-              </a:rPr>
-              <a:t> deactivate </a:t>
-            </a:r>
-            <a:r>
-              <a:rPr lang="en-GB" dirty="0" err="1">
-                <a:solidFill>
-                  <a:srgbClr val="0070C0"/>
-                </a:solidFill>
-              </a:rPr>
-              <a:t>trinityENV</a:t>
-            </a:r>
-            <a:r>
-              <a:rPr lang="en-GB" dirty="0">
-                <a:solidFill>
-                  <a:srgbClr val="0070C0"/>
-                </a:solidFill>
-              </a:rPr>
-              <a:t>  </a:t>
-            </a:r>
-            <a:r>
-              <a:rPr lang="en-GB" dirty="0"/>
-              <a:t>(deactivate so program versions in here don’t interfere with other tools)</a:t>
-            </a:r>
-          </a:p>
-          <a:p>
-            <a:pPr marL="0" indent="0">
-              <a:buNone/>
-            </a:pPr>
-            <a:endParaRPr lang="en-GB" dirty="0">
-              <a:solidFill>
-                <a:srgbClr val="0070C0"/>
-              </a:solidFill>
-            </a:endParaRPr>
-          </a:p>
-          <a:p>
-            <a:pPr marL="0" indent="0">
-              <a:buNone/>
-            </a:pPr>
-            <a:endParaRPr lang="en-GB" dirty="0">
-              <a:solidFill>
-                <a:srgbClr val="0070C0"/>
-              </a:solidFill>
-            </a:endParaRPr>
-          </a:p>
-          <a:p>
-            <a:endParaRPr lang="en-GB" dirty="0"/>
-          </a:p>
-        </p:txBody>
-      </p:sp>
-      <p:sp>
-        <p:nvSpPr>
-          <p:cNvPr id="4" name="TextBox 3">
-            <a:extLst>
-              <a:ext uri="{FF2B5EF4-FFF2-40B4-BE49-F238E27FC236}">
-                <a16:creationId xmlns:a16="http://schemas.microsoft.com/office/drawing/2014/main" id="{922D8B46-3165-49A6-848C-A9356D467285}"/>
-              </a:ext>
-            </a:extLst>
-          </p:cNvPr>
-          <p:cNvSpPr txBox="1"/>
-          <p:nvPr/>
-        </p:nvSpPr>
-        <p:spPr>
-          <a:xfrm>
-            <a:off x="10350500" y="0"/>
-            <a:ext cx="1841500" cy="584775"/>
-          </a:xfrm>
-          <a:prstGeom prst="rect">
-            <a:avLst/>
-          </a:prstGeom>
-          <a:noFill/>
-        </p:spPr>
-        <p:txBody>
-          <a:bodyPr wrap="square" rtlCol="0">
-            <a:spAutoFit/>
-          </a:bodyPr>
-          <a:lstStyle/>
-          <a:p>
-            <a:r>
-              <a:rPr lang="en-GB" sz="3200" dirty="0">
-                <a:solidFill>
-                  <a:srgbClr val="FF0000"/>
-                </a:solidFill>
-                <a:highlight>
-                  <a:srgbClr val="FFFF00"/>
-                </a:highlight>
-              </a:rPr>
-              <a:t>ACTIVITY</a:t>
-            </a:r>
-            <a:endParaRPr lang="en-GB" sz="2800" dirty="0">
-              <a:solidFill>
-                <a:srgbClr val="FF0000"/>
-              </a:solidFill>
-              <a:highlight>
-                <a:srgbClr val="FFFF00"/>
-              </a:highlight>
-            </a:endParaRPr>
-          </a:p>
-        </p:txBody>
-      </p:sp>
-    </p:spTree>
-    <p:extLst>
-      <p:ext uri="{BB962C8B-B14F-4D97-AF65-F5344CB8AC3E}">
-        <p14:creationId xmlns:p14="http://schemas.microsoft.com/office/powerpoint/2010/main" val="114485588"/>
-      </p:ext>
-    </p:extLst>
-  </p:cSld>
-  <p:clrMapOvr>
-    <a:masterClrMapping/>
-  </p:clrMapOvr>
-</p:sld>
-</file>
-
 <file path=ppt/slides/slide12.xml><?xml version="1.0" encoding="utf-8"?>
 <p:sld xmlns:a="http://schemas.openxmlformats.org/drawingml/2006/main" xmlns:r="http://schemas.openxmlformats.org/officeDocument/2006/relationships" xmlns:p="http://schemas.openxmlformats.org/presentationml/2006/main">
   <p:cSld>
@@ -3983,7 +4020,7 @@
                   <a:srgbClr val="7030A0"/>
                 </a:solidFill>
               </a:rPr>
-              <a:t>7) Conda: show me all </a:t>
+              <a:t>7) Conda: installing in an “</a:t>
             </a:r>
             <a:r>
               <a:rPr lang="en-GB" dirty="0" err="1">
@@ -3991,7 +4028,7 @@
                   <a:srgbClr val="7030A0"/>
                 </a:solidFill>
               </a:rPr>
-              <a:t>envs</a:t>
+              <a:t>env</a:t>
             </a:r>
             <a:r>
               <a:rPr lang="en-GB" dirty="0">
@@ -3999,7 +4036,7 @@
                   <a:srgbClr val="7030A0"/>
                 </a:solidFill>
               </a:rPr>
-              <a:t> I have</a:t>
+              <a:t>”</a:t>
             </a:r>
           </a:p>
         </p:txBody>
@@ -4022,7 +4059,7 @@
         </p:nvSpPr>
         <p:spPr>
           <a:xfrm>
-            <a:off x="215900" y="986631"/>
+            <a:off x="254000" y="1253331"/>
             <a:ext cx="11506200" cy="4351338"/>
           </a:xfrm>
         </p:spPr>
@@ -4031,45 +4068,6 @@
             <a:normAutofit/>
           </a:bodyPr>
           <a:lstStyle/>
-          <a:p>
-            <a:pPr marL="0" indent="0">
-              <a:buNone/>
-            </a:pPr>
-            <a:r>
-              <a:rPr lang="en-GB" dirty="0"/>
-              <a:t>After a while, you will forget, or forget the names:</a:t>
-            </a:r>
-          </a:p>
-          <a:p>
-            <a:pPr marL="0" indent="0">
-              <a:buNone/>
-            </a:pPr>
-            <a:r>
-              <a:rPr lang="en-GB" dirty="0" err="1">
-                <a:solidFill>
-                  <a:srgbClr val="0070C0"/>
-                </a:solidFill>
-              </a:rPr>
-              <a:t>conda</a:t>
-            </a:r>
-            <a:r>
-              <a:rPr lang="en-GB" dirty="0">
-                <a:solidFill>
-                  <a:srgbClr val="0070C0"/>
-                </a:solidFill>
-              </a:rPr>
-              <a:t> info --</a:t>
-            </a:r>
-            <a:r>
-              <a:rPr lang="en-GB" dirty="0" err="1">
-                <a:solidFill>
-                  <a:srgbClr val="0070C0"/>
-                </a:solidFill>
-              </a:rPr>
-              <a:t>envs</a:t>
-            </a:r>
-            <a:endParaRPr lang="en-GB" dirty="0"/>
-          </a:p>
           <a:p>
             <a:pPr marL="0" indent="0">
               <a:buNone/>
@@ -4084,6 +4082,47 @@
             <a:pPr marL="0" indent="0">
               <a:buNone/>
             </a:pPr>
+            <a:r>
+              <a:rPr lang="en-GB" dirty="0" err="1">
+                <a:solidFill>
+                  <a:srgbClr val="0070C0"/>
+                </a:solidFill>
+              </a:rPr>
+              <a:t>conda</a:t>
+            </a:r>
+            <a:r>
+              <a:rPr lang="en-GB" dirty="0">
+                <a:solidFill>
+                  <a:srgbClr val="0070C0"/>
+                </a:solidFill>
+              </a:rPr>
+              <a:t> deactivate </a:t>
+            </a:r>
+            <a:r>
+              <a:rPr lang="en-GB" dirty="0" err="1">
+                <a:solidFill>
+                  <a:srgbClr val="0070C0"/>
+                </a:solidFill>
+              </a:rPr>
+              <a:t>trinityENV</a:t>
+            </a:r>
+            <a:r>
+              <a:rPr lang="en-GB" dirty="0">
+                <a:solidFill>
+                  <a:srgbClr val="0070C0"/>
+                </a:solidFill>
+              </a:rPr>
+              <a:t>  </a:t>
+            </a:r>
+            <a:r>
+              <a:rPr lang="en-GB" dirty="0"/>
+              <a:t>(deactivate so program versions in here don’t interfere with other tools)</a:t>
+            </a:r>
+          </a:p>
+          <a:p>
+            <a:pPr marL="0" indent="0">
+              <a:buNone/>
+            </a:pPr>
             <a:endParaRPr lang="en-GB" dirty="0">
               <a:solidFill>
                 <a:srgbClr val="0070C0"/>
@@ -4091,51 +4130,26 @@
             </a:endParaRPr>
           </a:p>
           <a:p>
+            <a:pPr marL="0" indent="0">
+              <a:buNone/>
+            </a:pPr>
+            <a:endParaRPr lang="en-GB" dirty="0">
+              <a:solidFill>
+                <a:srgbClr val="0070C0"/>
+              </a:solidFill>
+            </a:endParaRPr>
+          </a:p>
+          <a:p>
             <a:endParaRPr lang="en-GB" dirty="0"/>
           </a:p>
         </p:txBody>
       </p:sp>
-      <p:pic>
-        <p:nvPicPr>
-          <p:cNvPr id="4" name="Picture 3">
-            <a:extLst>
-              <a:ext uri="{FF2B5EF4-FFF2-40B4-BE49-F238E27FC236}">
-                <a16:creationId xmlns:a16="http://schemas.microsoft.com/office/drawing/2014/main" id="{6EF05BDA-5888-4D22-A13C-C3C84D29BCFD}"/>
-              </a:ext>
-            </a:extLst>
-          </p:cNvPr>
-          <p:cNvPicPr>
-            <a:picLocks noChangeAspect="1"/>
-          </p:cNvPicPr>
-          <p:nvPr/>
-        </p:nvPicPr>
-        <p:blipFill rotWithShape="1">
-          <a:blip r:embed="rId2">
-            <a:extLst>
-              <a:ext uri="{28A0092B-C50C-407E-A947-70E740481C1C}">
-                <a14:useLocalDpi xmlns:a14="http://schemas.microsoft.com/office/drawing/2010/main" val="0"/>
-              </a:ext>
-            </a:extLst>
-          </a:blip>
-          <a:srcRect/>
-          <a:stretch/>
-        </p:blipFill>
-        <p:spPr>
-          <a:xfrm>
-            <a:off x="2159000" y="2042829"/>
-            <a:ext cx="7188200" cy="4815171"/>
-          </a:xfrm>
-          <a:prstGeom prst="rect">
-            <a:avLst/>
-          </a:prstGeom>
-        </p:spPr>
-      </p:pic>
-      <p:sp>
-        <p:nvSpPr>
-          <p:cNvPr id="5" name="TextBox 4">
-            <a:extLst>
-              <a:ext uri="{FF2B5EF4-FFF2-40B4-BE49-F238E27FC236}">
-                <a16:creationId xmlns:a16="http://schemas.microsoft.com/office/drawing/2014/main" id="{CC03E0F7-167C-4C99-B716-D394BDC40070}"/>
+      <p:sp>
+        <p:nvSpPr>
+          <p:cNvPr id="4" name="TextBox 3">
+            <a:extLst>
+              <a:ext uri="{FF2B5EF4-FFF2-40B4-BE49-F238E27FC236}">
+                <a16:creationId xmlns:a16="http://schemas.microsoft.com/office/drawing/2014/main" id="{922D8B46-3165-49A6-848C-A9356D467285}"/>
               </a:ext>
             </a:extLst>
           </p:cNvPr>
@@ -4183,7 +4197,7 @@
     </p:spTree>
     <p:extLst>
       <p:ext uri="{BB962C8B-B14F-4D97-AF65-F5344CB8AC3E}">
-        <p14:creationId xmlns:p14="http://schemas.microsoft.com/office/powerpoint/2010/main" val="3482148014"/>
+        <p14:creationId xmlns:p14="http://schemas.microsoft.com/office/powerpoint/2010/main" val="114485588"/>
       </p:ext>
     </p:extLst>
   </p:cSld>
@@ -4228,8 +4242,8 @@
         </p:nvSpPr>
         <p:spPr>
           <a:xfrm>
-            <a:off x="342900" y="0"/>
-            <a:ext cx="11417300" cy="1472406"/>
+            <a:off x="838200" y="-219075"/>
+            <a:ext cx="10515600" cy="1325563"/>
           </a:xfrm>
         </p:spPr>
         <p:txBody>
@@ -4242,7 +4256,23 @@
                   <a:srgbClr val="7030A0"/>
                 </a:solidFill>
               </a:rPr>
-              <a:t>7) Conda: installing multiple tools at once: specific python version</a:t>
+              <a:t>7) Conda: show me all </a:t>
+            </a:r>
+            <a:r>
+              <a:rPr lang="en-GB" dirty="0" err="1">
+                <a:solidFill>
+                  <a:srgbClr val="7030A0"/>
+                </a:solidFill>
+              </a:rPr>
+              <a:t>envs</a:t>
+            </a:r>
+            <a:r>
+              <a:rPr lang="en-GB" dirty="0">
+                <a:solidFill>
+                  <a:srgbClr val="7030A0"/>
+                </a:solidFill>
+              </a:rPr>
+              <a:t> I have</a:t>
             </a:r>
           </a:p>
         </p:txBody>
@@ -4265,7 +4295,7 @@
         </p:nvSpPr>
         <p:spPr>
           <a:xfrm>
-            <a:off x="342900" y="1532731"/>
+            <a:off x="215900" y="986631"/>
             <a:ext cx="11506200" cy="4351338"/>
           </a:xfrm>
         </p:spPr>
@@ -4279,12 +4309,29 @@
               <a:buNone/>
             </a:pPr>
             <a:r>
+              <a:rPr lang="en-GB" dirty="0"/>
+              <a:t>After a while, you will forget, or forget the names:</a:t>
+            </a:r>
+          </a:p>
+          <a:p>
+            <a:pPr marL="0" indent="0">
+              <a:buNone/>
+            </a:pPr>
+            <a:r>
+              <a:rPr lang="en-GB" dirty="0" err="1">
+                <a:solidFill>
+                  <a:srgbClr val="0070C0"/>
+                </a:solidFill>
+              </a:rPr>
+              <a:t>conda</a:t>
+            </a:r>
+            <a:r>
               <a:rPr lang="en-GB" dirty="0">
                 <a:solidFill>
                   <a:srgbClr val="0070C0"/>
                 </a:solidFill>
               </a:rPr>
-              <a:t> </a:t>
+              <a:t> info --</a:t>
             </a:r>
             <a:r>
               <a:rPr lang="en-GB" dirty="0" err="1">
@@ -4292,80 +4339,9 @@
                   <a:srgbClr val="0070C0"/>
                 </a:solidFill>
               </a:rPr>
-              <a:t>conda</a:t>
-            </a:r>
-            <a:r>
-              <a:rPr lang="en-GB" dirty="0">
-                <a:solidFill>
-                  <a:srgbClr val="0070C0"/>
-                </a:solidFill>
-              </a:rPr>
-              <a:t> create -n python36_bioperl python=3.6 </a:t>
-            </a:r>
-            <a:r>
-              <a:rPr lang="en-GB" dirty="0" err="1">
-                <a:solidFill>
-                  <a:srgbClr val="0070C0"/>
-                </a:solidFill>
-              </a:rPr>
-              <a:t>perl-bioperl</a:t>
-            </a:r>
-            <a:r>
-              <a:rPr lang="en-GB" dirty="0">
-                <a:solidFill>
-                  <a:srgbClr val="0070C0"/>
-                </a:solidFill>
-              </a:rPr>
-              <a:t> mummer </a:t>
-            </a:r>
-            <a:r>
-              <a:rPr lang="en-GB" dirty="0" err="1">
-                <a:solidFill>
-                  <a:srgbClr val="0070C0"/>
-                </a:solidFill>
-              </a:rPr>
-              <a:t>scipy</a:t>
-            </a:r>
-            <a:r>
-              <a:rPr lang="en-GB" dirty="0">
-                <a:solidFill>
-                  <a:srgbClr val="0070C0"/>
-                </a:solidFill>
-              </a:rPr>
-              <a:t> </a:t>
-            </a:r>
-            <a:r>
-              <a:rPr lang="en-GB" dirty="0" err="1">
-                <a:solidFill>
-                  <a:srgbClr val="0070C0"/>
-                </a:solidFill>
-              </a:rPr>
-              <a:t>numpy</a:t>
-            </a:r>
-            <a:r>
-              <a:rPr lang="en-GB" dirty="0">
-                <a:solidFill>
-                  <a:srgbClr val="0070C0"/>
-                </a:solidFill>
-              </a:rPr>
-              <a:t> </a:t>
-            </a:r>
-            <a:r>
-              <a:rPr lang="en-GB" dirty="0" err="1">
-                <a:solidFill>
-                  <a:srgbClr val="0070C0"/>
-                </a:solidFill>
-              </a:rPr>
-              <a:t>biopython</a:t>
-            </a:r>
-            <a:r>
-              <a:rPr lang="en-GB" dirty="0">
-                <a:solidFill>
-                  <a:srgbClr val="0070C0"/>
-                </a:solidFill>
-              </a:rPr>
-              <a:t> matplotlib</a:t>
-            </a:r>
+              <a:t>envs</a:t>
+            </a:r>
+            <a:endParaRPr lang="en-GB" dirty="0"/>
           </a:p>
           <a:p>
             <a:pPr marL="0" indent="0">
@@ -4378,14 +4354,109 @@
             </a:endParaRPr>
           </a:p>
           <a:p>
+            <a:pPr marL="0" indent="0">
+              <a:buNone/>
+            </a:pPr>
+            <a:endParaRPr lang="en-GB" dirty="0">
+              <a:solidFill>
+                <a:srgbClr val="0070C0"/>
+              </a:solidFill>
+            </a:endParaRPr>
+          </a:p>
+          <a:p>
             <a:endParaRPr lang="en-GB" dirty="0"/>
+          </a:p>
+        </p:txBody>
+      </p:sp>
+      <p:pic>
+        <p:nvPicPr>
+          <p:cNvPr id="4" name="Picture 3">
+            <a:extLst>
+              <a:ext uri="{FF2B5EF4-FFF2-40B4-BE49-F238E27FC236}">
+                <a16:creationId xmlns:a16="http://schemas.microsoft.com/office/drawing/2014/main" id="{6EF05BDA-5888-4D22-A13C-C3C84D29BCFD}"/>
+              </a:ext>
+            </a:extLst>
+          </p:cNvPr>
+          <p:cNvPicPr>
+            <a:picLocks noChangeAspect="1"/>
+          </p:cNvPicPr>
+          <p:nvPr/>
+        </p:nvPicPr>
+        <p:blipFill rotWithShape="1">
+          <a:blip r:embed="rId2">
+            <a:extLst>
+              <a:ext uri="{28A0092B-C50C-407E-A947-70E740481C1C}">
+                <a14:useLocalDpi xmlns:a14="http://schemas.microsoft.com/office/drawing/2010/main" val="0"/>
+              </a:ext>
+            </a:extLst>
+          </a:blip>
+          <a:srcRect/>
+          <a:stretch/>
+        </p:blipFill>
+        <p:spPr>
+          <a:xfrm>
+            <a:off x="2159000" y="2042829"/>
+            <a:ext cx="7188200" cy="4815171"/>
+          </a:xfrm>
+          <a:prstGeom prst="rect">
+            <a:avLst/>
+          </a:prstGeom>
+        </p:spPr>
+      </p:pic>
+      <p:sp>
+        <p:nvSpPr>
+          <p:cNvPr id="5" name="TextBox 4">
+            <a:extLst>
+              <a:ext uri="{FF2B5EF4-FFF2-40B4-BE49-F238E27FC236}">
+                <a16:creationId xmlns:a16="http://schemas.microsoft.com/office/drawing/2014/main" id="{CC03E0F7-167C-4C99-B716-D394BDC40070}"/>
+              </a:ext>
+            </a:extLst>
+          </p:cNvPr>
+          <p:cNvSpPr txBox="1"/>
+          <p:nvPr/>
+        </p:nvSpPr>
+        <p:spPr>
+          <a:xfrm>
+            <a:off x="10350500" y="0"/>
+            <a:ext cx="1841500" cy="584775"/>
+          </a:xfrm>
+          <a:prstGeom prst="rect">
+            <a:avLst/>
+          </a:prstGeom>
+          <a:noFill/>
+        </p:spPr>
+        <p:txBody>
+          <a:bodyPr wrap="square" rtlCol="0">
+            <a:spAutoFit/>
+          </a:bodyPr>
+          <a:lstStyle/>
+          <a:p>
+            <a:r>
+              <a:rPr lang="en-GB" sz="3200" dirty="0">
+                <a:solidFill>
+                  <a:srgbClr val="FF0000"/>
+                </a:solidFill>
+                <a:highlight>
+                  <a:srgbClr val="FFFF00"/>
+                </a:highlight>
+              </a:rPr>
+              <a:t>ACTIVITY</a:t>
+            </a:r>
+            <a:endParaRPr lang="en-GB" sz="2800" dirty="0">
+              <a:solidFill>
+                <a:srgbClr val="FF0000"/>
+              </a:solidFill>
+              <a:highlight>
+                <a:srgbClr val="FFFF00"/>
+              </a:highlight>
+            </a:endParaRPr>
           </a:p>
         </p:txBody>
       </p:sp>
     </p:spTree>
     <p:extLst>
       <p:ext uri="{BB962C8B-B14F-4D97-AF65-F5344CB8AC3E}">
-        <p14:creationId xmlns:p14="http://schemas.microsoft.com/office/powerpoint/2010/main" val="2643540796"/>
+        <p14:creationId xmlns:p14="http://schemas.microsoft.com/office/powerpoint/2010/main" val="3482148014"/>
       </p:ext>
     </p:extLst>
   </p:cSld>
@@ -4444,23 +4515,7 @@
                   <a:srgbClr val="7030A0"/>
                 </a:solidFill>
               </a:rPr>
-              <a:t>7) Conda: Error messages, </a:t>
-            </a:r>
-            <a:r>
-              <a:rPr lang="en-GB" dirty="0" err="1">
-                <a:solidFill>
-                  <a:srgbClr val="7030A0"/>
-                </a:solidFill>
-              </a:rPr>
-              <a:t>qsub</a:t>
-            </a:r>
-            <a:r>
-              <a:rPr lang="en-GB" dirty="0">
-                <a:solidFill>
-                  <a:srgbClr val="7030A0"/>
-                </a:solidFill>
-              </a:rPr>
-              <a:t> temp fix</a:t>
+              <a:t>7) Conda: installing multiple tools at once: specific python version</a:t>
             </a:r>
           </a:p>
         </p:txBody>
@@ -4489,25 +4544,20 @@
         </p:spPr>
         <p:txBody>
           <a:bodyPr>
-            <a:normAutofit fontScale="92500"/>
+            <a:normAutofit/>
           </a:bodyPr>
           <a:lstStyle/>
           <a:p>
-            <a:r>
-              <a:rPr lang="en-GB" dirty="0"/>
-              <a:t>Currently if you run </a:t>
-            </a:r>
+            <a:pPr marL="0" indent="0">
+              <a:buNone/>
+            </a:pPr>
             <a:r>
               <a:rPr lang="en-GB" dirty="0">
                 <a:solidFill>
                   <a:srgbClr val="0070C0"/>
                 </a:solidFill>
               </a:rPr>
-              <a:t>module load tool, </a:t>
-            </a:r>
-            <a:r>
-              <a:rPr lang="en-GB" dirty="0"/>
-              <a:t>then use </a:t>
+              <a:t> </a:t>
             </a:r>
             <a:r>
               <a:rPr lang="en-GB" dirty="0" err="1">
@@ -4523,7 +4573,7 @@
                   <a:srgbClr val="0070C0"/>
                 </a:solidFill>
               </a:rPr>
-              <a:t> activate </a:t>
+              <a:t> create -n python36_bioperl python=3.6 </a:t>
             </a:r>
             <a:r>
               <a:rPr lang="en-GB" dirty="0" err="1">
@@ -4531,78 +4581,15 @@
                   <a:srgbClr val="0070C0"/>
                 </a:solidFill>
               </a:rPr>
-              <a:t>env</a:t>
-            </a:r>
-            <a:endParaRPr lang="en-GB" dirty="0">
-              <a:solidFill>
-                <a:srgbClr val="0070C0"/>
-              </a:solidFill>
-            </a:endParaRPr>
-          </a:p>
-          <a:p>
-            <a:r>
-              <a:rPr lang="en-GB" dirty="0"/>
-              <a:t>This comes back with error messages. </a:t>
-            </a:r>
-          </a:p>
-          <a:p>
-            <a:r>
-              <a:rPr lang="en-GB" dirty="0"/>
-              <a:t>To fix this. Log out and back in again. </a:t>
-            </a:r>
-          </a:p>
-          <a:p>
-            <a:pPr marL="0" indent="0">
-              <a:buNone/>
-            </a:pPr>
-            <a:endParaRPr lang="en-GB" dirty="0"/>
-          </a:p>
-          <a:p>
-            <a:pPr marL="0" indent="0">
-              <a:buNone/>
-            </a:pPr>
-            <a:r>
-              <a:rPr lang="en-GB" b="1" dirty="0" err="1"/>
-              <a:t>qsub</a:t>
-            </a:r>
-            <a:r>
-              <a:rPr lang="en-GB" b="1" dirty="0"/>
-              <a:t> use -V, activate it first</a:t>
-            </a:r>
-          </a:p>
-          <a:p>
-            <a:pPr marL="0" indent="0">
-              <a:buNone/>
-            </a:pPr>
-            <a:r>
-              <a:rPr lang="en-GB" dirty="0"/>
-              <a:t>Remember </a:t>
-            </a:r>
-            <a:r>
-              <a:rPr lang="en-GB" dirty="0" err="1"/>
-              <a:t>qsubbing</a:t>
-            </a:r>
-            <a:r>
-              <a:rPr lang="en-GB" dirty="0"/>
-              <a:t> with a </a:t>
-            </a:r>
-            <a:r>
-              <a:rPr lang="en-GB" dirty="0" err="1"/>
-              <a:t>conda</a:t>
-            </a:r>
-            <a:r>
-              <a:rPr lang="en-GB" dirty="0"/>
-              <a:t> package:</a:t>
-            </a:r>
-          </a:p>
-          <a:p>
+              <a:t>perl-bioperl</a:t>
+            </a:r>
             <a:r>
               <a:rPr lang="en-GB" dirty="0">
                 <a:solidFill>
                   <a:srgbClr val="0070C0"/>
                 </a:solidFill>
               </a:rPr>
-              <a:t>Conda activate </a:t>
+              <a:t> mummer </a:t>
             </a:r>
             <a:r>
               <a:rPr lang="en-GB" dirty="0" err="1">
@@ -4610,18 +4597,15 @@
                   <a:srgbClr val="0070C0"/>
                 </a:solidFill>
               </a:rPr>
-              <a:t>env</a:t>
-            </a:r>
-            <a:endParaRPr lang="en-GB" dirty="0">
-              <a:solidFill>
-                <a:srgbClr val="0070C0"/>
-              </a:solidFill>
-            </a:endParaRPr>
-          </a:p>
-          <a:p>
-            <a:r>
-              <a:rPr lang="en-GB" dirty="0"/>
-              <a:t>then </a:t>
+              <a:t>scipy</a:t>
+            </a:r>
+            <a:r>
+              <a:rPr lang="en-GB" dirty="0">
+                <a:solidFill>
+                  <a:srgbClr val="0070C0"/>
+                </a:solidFill>
+              </a:rPr>
+              <a:t> </a:t>
             </a:r>
             <a:r>
               <a:rPr lang="en-GB" dirty="0" err="1">
@@ -4629,7 +4613,7 @@
                   <a:srgbClr val="0070C0"/>
                 </a:solidFill>
               </a:rPr>
-              <a:t>qsub</a:t>
+              <a:t>numpy</a:t>
             </a:r>
             <a:r>
               <a:rPr lang="en-GB" dirty="0">
@@ -4637,7 +4621,7 @@
                   <a:srgbClr val="0070C0"/>
                 </a:solidFill>
               </a:rPr>
-              <a:t> -V -</a:t>
+              <a:t> </a:t>
             </a:r>
             <a:r>
               <a:rPr lang="en-GB" dirty="0" err="1">
@@ -4645,7 +4629,7 @@
                   <a:srgbClr val="0070C0"/>
                 </a:solidFill>
               </a:rPr>
-              <a:t>pe</a:t>
+              <a:t>biopython</a:t>
             </a:r>
             <a:r>
               <a:rPr lang="en-GB" dirty="0">
@@ -4653,37 +4637,7 @@
                   <a:srgbClr val="0070C0"/>
                 </a:solidFill>
               </a:rPr>
-              <a:t> multi 4 name.sh</a:t>
-            </a:r>
-          </a:p>
-          <a:p>
-            <a:r>
-              <a:rPr lang="en-GB" dirty="0"/>
-              <a:t>We will fix it so you can add </a:t>
-            </a:r>
-            <a:r>
-              <a:rPr lang="en-GB" dirty="0" err="1"/>
-              <a:t>conda</a:t>
-            </a:r>
-            <a:r>
-              <a:rPr lang="en-GB" dirty="0"/>
-              <a:t> commands to the shell, we </a:t>
-            </a:r>
-            <a:r>
-              <a:rPr lang="en-GB" dirty="0" err="1"/>
-              <a:t>ar</a:t>
-            </a:r>
-            <a:r>
-              <a:rPr lang="en-GB" dirty="0"/>
-              <a:t> </a:t>
-            </a:r>
-            <a:r>
-              <a:rPr lang="en-GB" dirty="0" err="1"/>
-              <a:t>enot</a:t>
-            </a:r>
-            <a:r>
-              <a:rPr lang="en-GB" dirty="0"/>
-              <a:t> there yet</a:t>
+              <a:t> matplotlib</a:t>
             </a:r>
           </a:p>
           <a:p>
@@ -4704,7 +4658,7 @@
     </p:spTree>
     <p:extLst>
       <p:ext uri="{BB962C8B-B14F-4D97-AF65-F5344CB8AC3E}">
-        <p14:creationId xmlns:p14="http://schemas.microsoft.com/office/powerpoint/2010/main" val="3543718004"/>
+        <p14:creationId xmlns:p14="http://schemas.microsoft.com/office/powerpoint/2010/main" val="2643540796"/>
       </p:ext>
     </p:extLst>
   </p:cSld>
@@ -4736,6 +4690,449 @@
           <p:cNvPr id="2" name="Title 1">
             <a:extLst>
               <a:ext uri="{FF2B5EF4-FFF2-40B4-BE49-F238E27FC236}">
+                <a16:creationId xmlns:a16="http://schemas.microsoft.com/office/drawing/2014/main" id="{E0E33078-4396-4F2D-9BCD-FF8FF704BF20}"/>
+              </a:ext>
+            </a:extLst>
+          </p:cNvPr>
+          <p:cNvSpPr>
+            <a:spLocks noGrp="1"/>
+          </p:cNvSpPr>
+          <p:nvPr>
+            <p:ph type="title"/>
+          </p:nvPr>
+        </p:nvSpPr>
+        <p:spPr>
+          <a:xfrm>
+            <a:off x="342900" y="0"/>
+            <a:ext cx="11417300" cy="1472406"/>
+          </a:xfrm>
+        </p:spPr>
+        <p:txBody>
+          <a:bodyPr/>
+          <a:lstStyle/>
+          <a:p>
+            <a:r>
+              <a:rPr lang="en-GB" dirty="0">
+                <a:solidFill>
+                  <a:srgbClr val="7030A0"/>
+                </a:solidFill>
+              </a:rPr>
+              <a:t>7) Conda: errors</a:t>
+            </a:r>
+          </a:p>
+        </p:txBody>
+      </p:sp>
+      <p:sp>
+        <p:nvSpPr>
+          <p:cNvPr id="3" name="Content Placeholder 2">
+            <a:extLst>
+              <a:ext uri="{FF2B5EF4-FFF2-40B4-BE49-F238E27FC236}">
+                <a16:creationId xmlns:a16="http://schemas.microsoft.com/office/drawing/2014/main" id="{EBD8A9F9-A616-4F33-9309-8311F95B6F9F}"/>
+              </a:ext>
+            </a:extLst>
+          </p:cNvPr>
+          <p:cNvSpPr>
+            <a:spLocks noGrp="1"/>
+          </p:cNvSpPr>
+          <p:nvPr>
+            <p:ph idx="1"/>
+          </p:nvPr>
+        </p:nvSpPr>
+        <p:spPr>
+          <a:xfrm>
+            <a:off x="342900" y="1532731"/>
+            <a:ext cx="11506200" cy="4351338"/>
+          </a:xfrm>
+        </p:spPr>
+        <p:txBody>
+          <a:bodyPr>
+            <a:normAutofit/>
+          </a:bodyPr>
+          <a:lstStyle/>
+          <a:p>
+            <a:pPr marL="0" indent="0">
+              <a:buNone/>
+            </a:pPr>
+            <a:r>
+              <a:rPr lang="en-GB" dirty="0"/>
+              <a:t> If you get errors please contact the developers of the package via their </a:t>
+            </a:r>
+            <a:r>
+              <a:rPr lang="en-GB" dirty="0" err="1"/>
+              <a:t>gihub</a:t>
+            </a:r>
+            <a:r>
+              <a:rPr lang="en-GB" dirty="0"/>
+              <a:t> pages, or any other contact details they provide. They will be better suited to find errors in their software that us at </a:t>
+            </a:r>
+            <a:r>
+              <a:rPr lang="en-GB" dirty="0" err="1"/>
+              <a:t>STaBU</a:t>
+            </a:r>
+            <a:r>
+              <a:rPr lang="en-GB" dirty="0"/>
+              <a:t>. </a:t>
+            </a:r>
+          </a:p>
+          <a:p>
+            <a:endParaRPr lang="en-GB" dirty="0"/>
+          </a:p>
+        </p:txBody>
+      </p:sp>
+    </p:spTree>
+    <p:extLst>
+      <p:ext uri="{BB962C8B-B14F-4D97-AF65-F5344CB8AC3E}">
+        <p14:creationId xmlns:p14="http://schemas.microsoft.com/office/powerpoint/2010/main" val="208583226"/>
+      </p:ext>
+    </p:extLst>
+  </p:cSld>
+  <p:clrMapOvr>
+    <a:masterClrMapping/>
+  </p:clrMapOvr>
+</p:sld>
+</file>
+
+<file path=ppt/slides/slide16.xml><?xml version="1.0" encoding="utf-8"?>
+<p:sld xmlns:a="http://schemas.openxmlformats.org/drawingml/2006/main" xmlns:r="http://schemas.openxmlformats.org/officeDocument/2006/relationships" xmlns:p="http://schemas.openxmlformats.org/presentationml/2006/main">
+  <p:cSld>
+    <p:spTree>
+      <p:nvGrpSpPr>
+        <p:cNvPr id="1" name=""/>
+        <p:cNvGrpSpPr/>
+        <p:nvPr/>
+      </p:nvGrpSpPr>
+      <p:grpSpPr>
+        <a:xfrm>
+          <a:off x="0" y="0"/>
+          <a:ext cx="0" cy="0"/>
+          <a:chOff x="0" y="0"/>
+          <a:chExt cx="0" cy="0"/>
+        </a:xfrm>
+      </p:grpSpPr>
+      <p:sp>
+        <p:nvSpPr>
+          <p:cNvPr id="2" name="Title 1">
+            <a:extLst>
+              <a:ext uri="{FF2B5EF4-FFF2-40B4-BE49-F238E27FC236}">
+                <a16:creationId xmlns:a16="http://schemas.microsoft.com/office/drawing/2014/main" id="{E0E33078-4396-4F2D-9BCD-FF8FF704BF20}"/>
+              </a:ext>
+            </a:extLst>
+          </p:cNvPr>
+          <p:cNvSpPr>
+            <a:spLocks noGrp="1"/>
+          </p:cNvSpPr>
+          <p:nvPr>
+            <p:ph type="title"/>
+          </p:nvPr>
+        </p:nvSpPr>
+        <p:spPr>
+          <a:xfrm>
+            <a:off x="342900" y="0"/>
+            <a:ext cx="11417300" cy="1472406"/>
+          </a:xfrm>
+        </p:spPr>
+        <p:txBody>
+          <a:bodyPr/>
+          <a:lstStyle/>
+          <a:p>
+            <a:r>
+              <a:rPr lang="en-GB" dirty="0">
+                <a:solidFill>
+                  <a:srgbClr val="7030A0"/>
+                </a:solidFill>
+              </a:rPr>
+              <a:t>7) Conda: Error messages, </a:t>
+            </a:r>
+            <a:r>
+              <a:rPr lang="en-GB" dirty="0" err="1">
+                <a:solidFill>
+                  <a:srgbClr val="7030A0"/>
+                </a:solidFill>
+              </a:rPr>
+              <a:t>qsub</a:t>
+            </a:r>
+            <a:r>
+              <a:rPr lang="en-GB" dirty="0">
+                <a:solidFill>
+                  <a:srgbClr val="7030A0"/>
+                </a:solidFill>
+              </a:rPr>
+              <a:t> temp fix</a:t>
+            </a:r>
+          </a:p>
+        </p:txBody>
+      </p:sp>
+      <p:sp>
+        <p:nvSpPr>
+          <p:cNvPr id="3" name="Content Placeholder 2">
+            <a:extLst>
+              <a:ext uri="{FF2B5EF4-FFF2-40B4-BE49-F238E27FC236}">
+                <a16:creationId xmlns:a16="http://schemas.microsoft.com/office/drawing/2014/main" id="{EBD8A9F9-A616-4F33-9309-8311F95B6F9F}"/>
+              </a:ext>
+            </a:extLst>
+          </p:cNvPr>
+          <p:cNvSpPr>
+            <a:spLocks noGrp="1"/>
+          </p:cNvSpPr>
+          <p:nvPr>
+            <p:ph idx="1"/>
+          </p:nvPr>
+        </p:nvSpPr>
+        <p:spPr>
+          <a:xfrm>
+            <a:off x="342900" y="1532731"/>
+            <a:ext cx="11506200" cy="4351338"/>
+          </a:xfrm>
+        </p:spPr>
+        <p:txBody>
+          <a:bodyPr>
+            <a:normAutofit fontScale="92500"/>
+          </a:bodyPr>
+          <a:lstStyle/>
+          <a:p>
+            <a:r>
+              <a:rPr lang="en-GB" dirty="0"/>
+              <a:t>Currently if you run </a:t>
+            </a:r>
+            <a:r>
+              <a:rPr lang="en-GB" dirty="0">
+                <a:solidFill>
+                  <a:srgbClr val="0070C0"/>
+                </a:solidFill>
+              </a:rPr>
+              <a:t>module load tool, </a:t>
+            </a:r>
+            <a:r>
+              <a:rPr lang="en-GB" dirty="0"/>
+              <a:t>then use </a:t>
+            </a:r>
+            <a:r>
+              <a:rPr lang="en-GB" dirty="0" err="1">
+                <a:solidFill>
+                  <a:srgbClr val="0070C0"/>
+                </a:solidFill>
+              </a:rPr>
+              <a:t>conda</a:t>
+            </a:r>
+            <a:r>
+              <a:rPr lang="en-GB" dirty="0">
+                <a:solidFill>
+                  <a:srgbClr val="0070C0"/>
+                </a:solidFill>
+              </a:rPr>
+              <a:t> activate </a:t>
+            </a:r>
+            <a:r>
+              <a:rPr lang="en-GB" dirty="0" err="1">
+                <a:solidFill>
+                  <a:srgbClr val="0070C0"/>
+                </a:solidFill>
+              </a:rPr>
+              <a:t>env</a:t>
+            </a:r>
+            <a:endParaRPr lang="en-GB" dirty="0">
+              <a:solidFill>
+                <a:srgbClr val="0070C0"/>
+              </a:solidFill>
+            </a:endParaRPr>
+          </a:p>
+          <a:p>
+            <a:r>
+              <a:rPr lang="en-GB" dirty="0"/>
+              <a:t>This comes back with error messages. </a:t>
+            </a:r>
+          </a:p>
+          <a:p>
+            <a:r>
+              <a:rPr lang="en-GB" dirty="0"/>
+              <a:t>To fix this. Log out and back in again. </a:t>
+            </a:r>
+          </a:p>
+          <a:p>
+            <a:pPr marL="0" indent="0">
+              <a:buNone/>
+            </a:pPr>
+            <a:endParaRPr lang="en-GB" dirty="0"/>
+          </a:p>
+          <a:p>
+            <a:pPr marL="0" indent="0">
+              <a:buNone/>
+            </a:pPr>
+            <a:r>
+              <a:rPr lang="en-GB" b="1" dirty="0" err="1"/>
+              <a:t>qsub</a:t>
+            </a:r>
+            <a:r>
+              <a:rPr lang="en-GB" b="1" dirty="0"/>
+              <a:t> use -V, activate it first</a:t>
+            </a:r>
+          </a:p>
+          <a:p>
+            <a:pPr marL="0" indent="0">
+              <a:buNone/>
+            </a:pPr>
+            <a:r>
+              <a:rPr lang="en-GB" dirty="0"/>
+              <a:t>Remember </a:t>
+            </a:r>
+            <a:r>
+              <a:rPr lang="en-GB" dirty="0" err="1"/>
+              <a:t>qsubbing</a:t>
+            </a:r>
+            <a:r>
+              <a:rPr lang="en-GB" dirty="0"/>
+              <a:t> with a </a:t>
+            </a:r>
+            <a:r>
+              <a:rPr lang="en-GB" dirty="0" err="1"/>
+              <a:t>conda</a:t>
+            </a:r>
+            <a:r>
+              <a:rPr lang="en-GB" dirty="0"/>
+              <a:t> package:</a:t>
+            </a:r>
+          </a:p>
+          <a:p>
+            <a:r>
+              <a:rPr lang="en-GB" dirty="0">
+                <a:solidFill>
+                  <a:srgbClr val="0070C0"/>
+                </a:solidFill>
+              </a:rPr>
+              <a:t>Conda activate </a:t>
+            </a:r>
+            <a:r>
+              <a:rPr lang="en-GB" dirty="0" err="1">
+                <a:solidFill>
+                  <a:srgbClr val="0070C0"/>
+                </a:solidFill>
+              </a:rPr>
+              <a:t>env</a:t>
+            </a:r>
+            <a:endParaRPr lang="en-GB" dirty="0">
+              <a:solidFill>
+                <a:srgbClr val="0070C0"/>
+              </a:solidFill>
+            </a:endParaRPr>
+          </a:p>
+          <a:p>
+            <a:r>
+              <a:rPr lang="en-GB" dirty="0"/>
+              <a:t>then </a:t>
+            </a:r>
+            <a:r>
+              <a:rPr lang="en-GB" dirty="0" err="1">
+                <a:solidFill>
+                  <a:srgbClr val="0070C0"/>
+                </a:solidFill>
+              </a:rPr>
+              <a:t>qsub</a:t>
+            </a:r>
+            <a:r>
+              <a:rPr lang="en-GB" dirty="0">
+                <a:solidFill>
+                  <a:srgbClr val="0070C0"/>
+                </a:solidFill>
+              </a:rPr>
+              <a:t> -V -</a:t>
+            </a:r>
+            <a:r>
+              <a:rPr lang="en-GB" dirty="0" err="1">
+                <a:solidFill>
+                  <a:srgbClr val="0070C0"/>
+                </a:solidFill>
+              </a:rPr>
+              <a:t>pe</a:t>
+            </a:r>
+            <a:r>
+              <a:rPr lang="en-GB" dirty="0">
+                <a:solidFill>
+                  <a:srgbClr val="0070C0"/>
+                </a:solidFill>
+              </a:rPr>
+              <a:t> multi 4 name.sh</a:t>
+            </a:r>
+          </a:p>
+          <a:p>
+            <a:r>
+              <a:rPr lang="en-GB" dirty="0"/>
+              <a:t>We will fix it so you can add </a:t>
+            </a:r>
+            <a:r>
+              <a:rPr lang="en-GB" dirty="0" err="1"/>
+              <a:t>conda</a:t>
+            </a:r>
+            <a:r>
+              <a:rPr lang="en-GB" dirty="0"/>
+              <a:t> commands to the shell, we </a:t>
+            </a:r>
+            <a:r>
+              <a:rPr lang="en-GB" dirty="0" err="1"/>
+              <a:t>ar</a:t>
+            </a:r>
+            <a:r>
+              <a:rPr lang="en-GB" dirty="0"/>
+              <a:t> </a:t>
+            </a:r>
+            <a:r>
+              <a:rPr lang="en-GB" dirty="0" err="1"/>
+              <a:t>enot</a:t>
+            </a:r>
+            <a:r>
+              <a:rPr lang="en-GB" dirty="0"/>
+              <a:t> there yet</a:t>
+            </a:r>
+          </a:p>
+          <a:p>
+            <a:pPr marL="0" indent="0">
+              <a:buNone/>
+            </a:pPr>
+            <a:endParaRPr lang="en-GB" dirty="0">
+              <a:solidFill>
+                <a:srgbClr val="0070C0"/>
+              </a:solidFill>
+            </a:endParaRPr>
+          </a:p>
+          <a:p>
+            <a:endParaRPr lang="en-GB" dirty="0"/>
+          </a:p>
+        </p:txBody>
+      </p:sp>
+    </p:spTree>
+    <p:extLst>
+      <p:ext uri="{BB962C8B-B14F-4D97-AF65-F5344CB8AC3E}">
+        <p14:creationId xmlns:p14="http://schemas.microsoft.com/office/powerpoint/2010/main" val="3543718004"/>
+      </p:ext>
+    </p:extLst>
+  </p:cSld>
+  <p:clrMapOvr>
+    <a:masterClrMapping/>
+  </p:clrMapOvr>
+</p:sld>
+</file>
+
+<file path=ppt/slides/slide17.xml><?xml version="1.0" encoding="utf-8"?>
+<p:sld xmlns:a="http://schemas.openxmlformats.org/drawingml/2006/main" xmlns:r="http://schemas.openxmlformats.org/officeDocument/2006/relationships" xmlns:p="http://schemas.openxmlformats.org/presentationml/2006/main">
+  <p:cSld>
+    <p:spTree>
+      <p:nvGrpSpPr>
+        <p:cNvPr id="1" name=""/>
+        <p:cNvGrpSpPr/>
+        <p:nvPr/>
+      </p:nvGrpSpPr>
+      <p:grpSpPr>
+        <a:xfrm>
+          <a:off x="0" y="0"/>
+          <a:ext cx="0" cy="0"/>
+          <a:chOff x="0" y="0"/>
+          <a:chExt cx="0" cy="0"/>
+        </a:xfrm>
+      </p:grpSpPr>
+      <p:sp>
+        <p:nvSpPr>
+          <p:cNvPr id="2" name="Title 1">
+            <a:extLst>
+              <a:ext uri="{FF2B5EF4-FFF2-40B4-BE49-F238E27FC236}">
                 <a16:creationId xmlns:a16="http://schemas.microsoft.com/office/drawing/2014/main" id="{94497086-4B64-442A-AD55-9BFF3AFB8878}"/>
               </a:ext>
             </a:extLst>
@@ -4813,7 +5210,7 @@
 </p:sld>
 </file>
 
-<file path=ppt/slides/slide16.xml><?xml version="1.0" encoding="utf-8"?>
+<file path=ppt/slides/slide18.xml><?xml version="1.0" encoding="utf-8"?>
 <p:sld xmlns:a="http://schemas.openxmlformats.org/drawingml/2006/main" xmlns:r="http://schemas.openxmlformats.org/officeDocument/2006/relationships" xmlns:p="http://schemas.openxmlformats.org/presentationml/2006/main">
   <p:cSld>
     <p:spTree>
@@ -6191,7 +6588,7 @@
         </p:nvSpPr>
         <p:spPr>
           <a:xfrm>
-            <a:off x="-2" y="-65881"/>
+            <a:off x="0" y="-98105"/>
             <a:ext cx="12192002" cy="1325563"/>
           </a:xfrm>
         </p:spPr>
@@ -6250,13 +6647,13 @@
               </a:ext>
             </a:extLst>
           </a:blip>
-          <a:srcRect/>
+          <a:srcRect r="7966"/>
           <a:stretch/>
         </p:blipFill>
         <p:spPr>
           <a:xfrm>
             <a:off x="-1" y="1104900"/>
-            <a:ext cx="9142427" cy="5171282"/>
+            <a:ext cx="8414159" cy="5171282"/>
           </a:xfrm>
           <a:prstGeom prst="rect">
             <a:avLst/>
@@ -6342,6 +6739,94 @@
           </a:fontRef>
         </p:style>
       </p:cxnSp>
+      <p:cxnSp>
+        <p:nvCxnSpPr>
+          <p:cNvPr id="9" name="Straight Arrow Connector 8">
+            <a:extLst>
+              <a:ext uri="{FF2B5EF4-FFF2-40B4-BE49-F238E27FC236}">
+                <a16:creationId xmlns:a16="http://schemas.microsoft.com/office/drawing/2014/main" id="{A7C3740B-9A32-4FF3-9E06-2D6EC3AF0E8C}"/>
+              </a:ext>
+            </a:extLst>
+          </p:cNvPr>
+          <p:cNvCxnSpPr/>
+          <p:nvPr/>
+        </p:nvCxnSpPr>
+        <p:spPr>
+          <a:xfrm flipH="1" flipV="1">
+            <a:off x="8800051" y="805343"/>
+            <a:ext cx="1904301" cy="704675"/>
+          </a:xfrm>
+          <a:prstGeom prst="straightConnector1">
+            <a:avLst/>
+          </a:prstGeom>
+          <a:ln>
+            <a:tailEnd type="triangle"/>
+          </a:ln>
+        </p:spPr>
+        <p:style>
+          <a:lnRef idx="3">
+            <a:schemeClr val="accent2"/>
+          </a:lnRef>
+          <a:fillRef idx="0">
+            <a:schemeClr val="accent2"/>
+          </a:fillRef>
+          <a:effectRef idx="2">
+            <a:schemeClr val="accent2"/>
+          </a:effectRef>
+          <a:fontRef idx="minor">
+            <a:schemeClr val="tx1"/>
+          </a:fontRef>
+        </p:style>
+      </p:cxnSp>
+      <p:sp>
+        <p:nvSpPr>
+          <p:cNvPr id="10" name="TextBox 9">
+            <a:extLst>
+              <a:ext uri="{FF2B5EF4-FFF2-40B4-BE49-F238E27FC236}">
+                <a16:creationId xmlns:a16="http://schemas.microsoft.com/office/drawing/2014/main" id="{E9FEC413-D5D8-467B-9ABE-175574DE6238}"/>
+              </a:ext>
+            </a:extLst>
+          </p:cNvPr>
+          <p:cNvSpPr txBox="1"/>
+          <p:nvPr/>
+        </p:nvSpPr>
+        <p:spPr>
+          <a:xfrm>
+            <a:off x="8590327" y="1230128"/>
+            <a:ext cx="3464653" cy="2092881"/>
+          </a:xfrm>
+          <a:prstGeom prst="rect">
+            <a:avLst/>
+          </a:prstGeom>
+          <a:noFill/>
+        </p:spPr>
+        <p:txBody>
+          <a:bodyPr wrap="square" rtlCol="0">
+            <a:spAutoFit/>
+          </a:bodyPr>
+          <a:lstStyle/>
+          <a:p>
+            <a:r>
+              <a:rPr lang="en-GB" sz="2800" dirty="0">
+                <a:highlight>
+                  <a:srgbClr val="FFFF00"/>
+                </a:highlight>
+              </a:rPr>
+              <a:t>NOW CALLED: </a:t>
+            </a:r>
+            <a:r>
+              <a:rPr lang="en-GB" sz="2800" dirty="0">
+                <a:hlinkClick r:id="rId3"/>
+              </a:rPr>
+              <a:t>https://bioconda.github.io/conda-recipe_index.html</a:t>
+            </a:r>
+            <a:endParaRPr lang="en-GB" sz="2800" dirty="0"/>
+          </a:p>
+          <a:p>
+            <a:endParaRPr lang="en-GB" dirty="0"/>
+          </a:p>
+        </p:txBody>
+      </p:sp>
     </p:spTree>
     <p:extLst>
       <p:ext uri="{BB962C8B-B14F-4D97-AF65-F5344CB8AC3E}">
@@ -6377,6 +6862,200 @@
           <p:cNvPr id="2" name="Title 1">
             <a:extLst>
               <a:ext uri="{FF2B5EF4-FFF2-40B4-BE49-F238E27FC236}">
+                <a16:creationId xmlns:a16="http://schemas.microsoft.com/office/drawing/2014/main" id="{AA70CF6B-11B2-4668-B5FE-C89168FEE54C}"/>
+              </a:ext>
+            </a:extLst>
+          </p:cNvPr>
+          <p:cNvSpPr>
+            <a:spLocks noGrp="1"/>
+          </p:cNvSpPr>
+          <p:nvPr>
+            <p:ph type="title"/>
+          </p:nvPr>
+        </p:nvSpPr>
+        <p:spPr>
+          <a:xfrm>
+            <a:off x="-2" y="-65881"/>
+            <a:ext cx="12192002" cy="1325563"/>
+          </a:xfrm>
+        </p:spPr>
+        <p:txBody>
+          <a:bodyPr>
+            <a:normAutofit/>
+          </a:bodyPr>
+          <a:lstStyle/>
+          <a:p>
+            <a:r>
+              <a:rPr lang="en-GB" sz="4000" dirty="0">
+                <a:solidFill>
+                  <a:srgbClr val="7030A0"/>
+                </a:solidFill>
+              </a:rPr>
+              <a:t>7) Conda: Google search </a:t>
+            </a:r>
+            <a:r>
+              <a:rPr lang="en-GB" sz="4000" dirty="0" err="1">
+                <a:solidFill>
+                  <a:srgbClr val="7030A0"/>
+                </a:solidFill>
+              </a:rPr>
+              <a:t>bioconda</a:t>
+            </a:r>
+            <a:r>
+              <a:rPr lang="en-GB" sz="4000" dirty="0">
+                <a:solidFill>
+                  <a:srgbClr val="7030A0"/>
+                </a:solidFill>
+              </a:rPr>
+              <a:t> (available packages)</a:t>
+            </a:r>
+          </a:p>
+        </p:txBody>
+      </p:sp>
+      <p:sp>
+        <p:nvSpPr>
+          <p:cNvPr id="3" name="TextBox 2">
+            <a:extLst>
+              <a:ext uri="{FF2B5EF4-FFF2-40B4-BE49-F238E27FC236}">
+                <a16:creationId xmlns:a16="http://schemas.microsoft.com/office/drawing/2014/main" id="{8AE91F90-E2DF-429C-B0F8-BB67D71C232A}"/>
+              </a:ext>
+            </a:extLst>
+          </p:cNvPr>
+          <p:cNvSpPr txBox="1"/>
+          <p:nvPr/>
+        </p:nvSpPr>
+        <p:spPr>
+          <a:xfrm>
+            <a:off x="1057013" y="1493240"/>
+            <a:ext cx="9278224" cy="1200329"/>
+          </a:xfrm>
+          <a:prstGeom prst="rect">
+            <a:avLst/>
+          </a:prstGeom>
+          <a:noFill/>
+        </p:spPr>
+        <p:txBody>
+          <a:bodyPr wrap="square" rtlCol="0">
+            <a:spAutoFit/>
+          </a:bodyPr>
+          <a:lstStyle/>
+          <a:p>
+            <a:r>
+              <a:rPr lang="en-GB" dirty="0"/>
+              <a:t>The last webpage shown has been “down” for a while. So you can just google search </a:t>
+            </a:r>
+            <a:r>
+              <a:rPr lang="en-GB" dirty="0" err="1"/>
+              <a:t>conda</a:t>
+            </a:r>
+            <a:r>
+              <a:rPr lang="en-GB" dirty="0"/>
+              <a:t> install TOOL_OF_INTEREST</a:t>
+            </a:r>
+          </a:p>
+          <a:p>
+            <a:endParaRPr lang="en-GB" dirty="0"/>
+          </a:p>
+          <a:p>
+            <a:r>
+              <a:rPr lang="en-GB" dirty="0"/>
+              <a:t>This will search all channels, not just </a:t>
+            </a:r>
+            <a:r>
+              <a:rPr lang="en-GB" dirty="0" err="1"/>
+              <a:t>bioconda</a:t>
+            </a:r>
+            <a:r>
+              <a:rPr lang="en-GB" dirty="0"/>
+              <a:t>. Which is actually good.</a:t>
+            </a:r>
+          </a:p>
+        </p:txBody>
+      </p:sp>
+      <p:sp>
+        <p:nvSpPr>
+          <p:cNvPr id="8" name="TextBox 7">
+            <a:extLst>
+              <a:ext uri="{FF2B5EF4-FFF2-40B4-BE49-F238E27FC236}">
+                <a16:creationId xmlns:a16="http://schemas.microsoft.com/office/drawing/2014/main" id="{133F10E3-0089-4F5F-A084-0E4066D898CF}"/>
+              </a:ext>
+            </a:extLst>
+          </p:cNvPr>
+          <p:cNvSpPr txBox="1"/>
+          <p:nvPr/>
+        </p:nvSpPr>
+        <p:spPr>
+          <a:xfrm>
+            <a:off x="956345" y="3671324"/>
+            <a:ext cx="10905688" cy="800219"/>
+          </a:xfrm>
+          <a:prstGeom prst="rect">
+            <a:avLst/>
+          </a:prstGeom>
+          <a:noFill/>
+        </p:spPr>
+        <p:txBody>
+          <a:bodyPr wrap="square" rtlCol="0">
+            <a:spAutoFit/>
+          </a:bodyPr>
+          <a:lstStyle/>
+          <a:p>
+            <a:r>
+              <a:rPr lang="en-GB" sz="2800" dirty="0">
+                <a:highlight>
+                  <a:srgbClr val="FFFF00"/>
+                </a:highlight>
+              </a:rPr>
+              <a:t>NOW CALLED: </a:t>
+            </a:r>
+            <a:r>
+              <a:rPr lang="en-GB" sz="2800" dirty="0">
+                <a:hlinkClick r:id="rId2"/>
+              </a:rPr>
+              <a:t>https://bioconda.github.io/conda-recipe_index.html</a:t>
+            </a:r>
+            <a:endParaRPr lang="en-GB" sz="2800" dirty="0"/>
+          </a:p>
+          <a:p>
+            <a:endParaRPr lang="en-GB" dirty="0"/>
+          </a:p>
+        </p:txBody>
+      </p:sp>
+    </p:spTree>
+    <p:extLst>
+      <p:ext uri="{BB962C8B-B14F-4D97-AF65-F5344CB8AC3E}">
+        <p14:creationId xmlns:p14="http://schemas.microsoft.com/office/powerpoint/2010/main" val="3435998854"/>
+      </p:ext>
+    </p:extLst>
+  </p:cSld>
+  <p:clrMapOvr>
+    <a:masterClrMapping/>
+  </p:clrMapOvr>
+</p:sld>
+</file>
+
+<file path=ppt/slides/slide6.xml><?xml version="1.0" encoding="utf-8"?>
+<p:sld xmlns:a="http://schemas.openxmlformats.org/drawingml/2006/main" xmlns:r="http://schemas.openxmlformats.org/officeDocument/2006/relationships" xmlns:p="http://schemas.openxmlformats.org/presentationml/2006/main">
+  <p:cSld>
+    <p:spTree>
+      <p:nvGrpSpPr>
+        <p:cNvPr id="1" name=""/>
+        <p:cNvGrpSpPr/>
+        <p:nvPr/>
+      </p:nvGrpSpPr>
+      <p:grpSpPr>
+        <a:xfrm>
+          <a:off x="0" y="0"/>
+          <a:ext cx="0" cy="0"/>
+          <a:chOff x="0" y="0"/>
+          <a:chExt cx="0" cy="0"/>
+        </a:xfrm>
+      </p:grpSpPr>
+      <p:sp>
+        <p:nvSpPr>
+          <p:cNvPr id="2" name="Title 1">
+            <a:extLst>
+              <a:ext uri="{FF2B5EF4-FFF2-40B4-BE49-F238E27FC236}">
                 <a16:creationId xmlns:a16="http://schemas.microsoft.com/office/drawing/2014/main" id="{F181B232-5745-4168-89A5-D83B6149F774}"/>
               </a:ext>
             </a:extLst>
@@ -6562,7 +7241,7 @@
 </p:sld>
 </file>
 
-<file path=ppt/slides/slide6.xml><?xml version="1.0" encoding="utf-8"?>
+<file path=ppt/slides/slide7.xml><?xml version="1.0" encoding="utf-8"?>
 <p:sld xmlns:a="http://schemas.openxmlformats.org/drawingml/2006/main" xmlns:r="http://schemas.openxmlformats.org/officeDocument/2006/relationships" xmlns:p="http://schemas.openxmlformats.org/presentationml/2006/main">
   <p:cSld>
     <p:spTree>
@@ -6774,7 +7453,7 @@
 </p:sld>
 </file>
 
-<file path=ppt/slides/slide7.xml><?xml version="1.0" encoding="utf-8"?>
+<file path=ppt/slides/slide8.xml><?xml version="1.0" encoding="utf-8"?>
 <p:sld xmlns:a="http://schemas.openxmlformats.org/drawingml/2006/main" xmlns:r="http://schemas.openxmlformats.org/officeDocument/2006/relationships" xmlns:p="http://schemas.openxmlformats.org/presentationml/2006/main">
   <p:cSld>
     <p:spTree>
@@ -7108,7 +7787,7 @@
 </p:sld>
 </file>
 
-<file path=ppt/slides/slide8.xml><?xml version="1.0" encoding="utf-8"?>
+<file path=ppt/slides/slide9.xml><?xml version="1.0" encoding="utf-8"?>
 <p:sld xmlns:a="http://schemas.openxmlformats.org/drawingml/2006/main" xmlns:r="http://schemas.openxmlformats.org/officeDocument/2006/relationships" xmlns:p="http://schemas.openxmlformats.org/presentationml/2006/main">
   <p:cSld>
     <p:spTree>
@@ -7294,277 +7973,6 @@
     <p:extLst>
       <p:ext uri="{BB962C8B-B14F-4D97-AF65-F5344CB8AC3E}">
         <p14:creationId xmlns:p14="http://schemas.microsoft.com/office/powerpoint/2010/main" val="1206697204"/>
-      </p:ext>
-    </p:extLst>
-  </p:cSld>
-  <p:clrMapOvr>
-    <a:masterClrMapping/>
-  </p:clrMapOvr>
-</p:sld>
-</file>
-
-<file path=ppt/slides/slide9.xml><?xml version="1.0" encoding="utf-8"?>
-<p:sld xmlns:a="http://schemas.openxmlformats.org/drawingml/2006/main" xmlns:r="http://schemas.openxmlformats.org/officeDocument/2006/relationships" xmlns:p="http://schemas.openxmlformats.org/presentationml/2006/main">
-  <p:cSld>
-    <p:spTree>
-      <p:nvGrpSpPr>
-        <p:cNvPr id="1" name=""/>
-        <p:cNvGrpSpPr/>
-        <p:nvPr/>
-      </p:nvGrpSpPr>
-      <p:grpSpPr>
-        <a:xfrm>
-          <a:off x="0" y="0"/>
-          <a:ext cx="0" cy="0"/>
-          <a:chOff x="0" y="0"/>
-          <a:chExt cx="0" cy="0"/>
-        </a:xfrm>
-      </p:grpSpPr>
-      <p:sp>
-        <p:nvSpPr>
-          <p:cNvPr id="2" name="Title 1">
-            <a:extLst>
-              <a:ext uri="{FF2B5EF4-FFF2-40B4-BE49-F238E27FC236}">
-                <a16:creationId xmlns:a16="http://schemas.microsoft.com/office/drawing/2014/main" id="{E0E33078-4396-4F2D-9BCD-FF8FF704BF20}"/>
-              </a:ext>
-            </a:extLst>
-          </p:cNvPr>
-          <p:cNvSpPr>
-            <a:spLocks noGrp="1"/>
-          </p:cNvSpPr>
-          <p:nvPr>
-            <p:ph type="title"/>
-          </p:nvPr>
-        </p:nvSpPr>
-        <p:spPr>
-          <a:xfrm>
-            <a:off x="838200" y="-219075"/>
-            <a:ext cx="10515600" cy="1325563"/>
-          </a:xfrm>
-        </p:spPr>
-        <p:txBody>
-          <a:bodyPr/>
-          <a:lstStyle/>
-          <a:p>
-            <a:pPr algn="ctr"/>
-            <a:r>
-              <a:rPr lang="en-GB" dirty="0">
-                <a:solidFill>
-                  <a:srgbClr val="7030A0"/>
-                </a:solidFill>
-              </a:rPr>
-              <a:t>7) Conda: installing in an “</a:t>
-            </a:r>
-            <a:r>
-              <a:rPr lang="en-GB" dirty="0" err="1">
-                <a:solidFill>
-                  <a:srgbClr val="7030A0"/>
-                </a:solidFill>
-              </a:rPr>
-              <a:t>env</a:t>
-            </a:r>
-            <a:r>
-              <a:rPr lang="en-GB" dirty="0">
-                <a:solidFill>
-                  <a:srgbClr val="7030A0"/>
-                </a:solidFill>
-              </a:rPr>
-              <a:t>”</a:t>
-            </a:r>
-          </a:p>
-        </p:txBody>
-      </p:sp>
-      <p:sp>
-        <p:nvSpPr>
-          <p:cNvPr id="3" name="Content Placeholder 2">
-            <a:extLst>
-              <a:ext uri="{FF2B5EF4-FFF2-40B4-BE49-F238E27FC236}">
-                <a16:creationId xmlns:a16="http://schemas.microsoft.com/office/drawing/2014/main" id="{EBD8A9F9-A616-4F33-9309-8311F95B6F9F}"/>
-              </a:ext>
-            </a:extLst>
-          </p:cNvPr>
-          <p:cNvSpPr>
-            <a:spLocks noGrp="1"/>
-          </p:cNvSpPr>
-          <p:nvPr>
-            <p:ph idx="1"/>
-          </p:nvPr>
-        </p:nvSpPr>
-        <p:spPr>
-          <a:xfrm>
-            <a:off x="152400" y="758031"/>
-            <a:ext cx="11506200" cy="4351338"/>
-          </a:xfrm>
-        </p:spPr>
-        <p:txBody>
-          <a:bodyPr>
-            <a:normAutofit/>
-          </a:bodyPr>
-          <a:lstStyle/>
-          <a:p>
-            <a:pPr marL="0" indent="0">
-              <a:buNone/>
-            </a:pPr>
-            <a:endParaRPr lang="en-GB" dirty="0">
-              <a:solidFill>
-                <a:srgbClr val="0070C0"/>
-              </a:solidFill>
-            </a:endParaRPr>
-          </a:p>
-          <a:p>
-            <a:pPr marL="0" indent="0">
-              <a:buNone/>
-            </a:pPr>
-            <a:r>
-              <a:rPr lang="en-GB" dirty="0" err="1">
-                <a:solidFill>
-                  <a:srgbClr val="0070C0"/>
-                </a:solidFill>
-              </a:rPr>
-              <a:t>conda</a:t>
-            </a:r>
-            <a:r>
-              <a:rPr lang="en-GB" dirty="0">
-                <a:solidFill>
-                  <a:srgbClr val="0070C0"/>
-                </a:solidFill>
-              </a:rPr>
-              <a:t> activate trinity     </a:t>
-            </a:r>
-            <a:r>
-              <a:rPr lang="en-GB" dirty="0"/>
-              <a:t>(you have to activate it to use it)</a:t>
-            </a:r>
-          </a:p>
-          <a:p>
-            <a:pPr marL="0" indent="0">
-              <a:buNone/>
-            </a:pPr>
-            <a:endParaRPr lang="en-GB" dirty="0"/>
-          </a:p>
-          <a:p>
-            <a:pPr marL="0" indent="0">
-              <a:buNone/>
-            </a:pPr>
-            <a:endParaRPr lang="en-GB" dirty="0">
-              <a:solidFill>
-                <a:srgbClr val="0070C0"/>
-              </a:solidFill>
-            </a:endParaRPr>
-          </a:p>
-          <a:p>
-            <a:pPr marL="0" indent="0">
-              <a:buNone/>
-            </a:pPr>
-            <a:r>
-              <a:rPr lang="en-GB" dirty="0"/>
-              <a:t>Name of </a:t>
-            </a:r>
-            <a:r>
-              <a:rPr lang="en-GB" dirty="0" err="1"/>
-              <a:t>env</a:t>
-            </a:r>
-            <a:endParaRPr lang="en-GB" dirty="0"/>
-          </a:p>
-          <a:p>
-            <a:pPr marL="0" indent="0">
-              <a:buNone/>
-            </a:pPr>
-            <a:endParaRPr lang="en-GB" dirty="0">
-              <a:solidFill>
-                <a:srgbClr val="0070C0"/>
-              </a:solidFill>
-            </a:endParaRPr>
-          </a:p>
-          <a:p>
-            <a:endParaRPr lang="en-GB" dirty="0">
-              <a:solidFill>
-                <a:srgbClr val="0070C0"/>
-              </a:solidFill>
-            </a:endParaRPr>
-          </a:p>
-        </p:txBody>
-      </p:sp>
-      <p:pic>
-        <p:nvPicPr>
-          <p:cNvPr id="4" name="Picture 3">
-            <a:extLst>
-              <a:ext uri="{FF2B5EF4-FFF2-40B4-BE49-F238E27FC236}">
-                <a16:creationId xmlns:a16="http://schemas.microsoft.com/office/drawing/2014/main" id="{92B58DEE-428B-4524-9A99-56C6F7ECD658}"/>
-              </a:ext>
-            </a:extLst>
-          </p:cNvPr>
-          <p:cNvPicPr>
-            <a:picLocks noChangeAspect="1"/>
-          </p:cNvPicPr>
-          <p:nvPr/>
-        </p:nvPicPr>
-        <p:blipFill rotWithShape="1">
-          <a:blip r:embed="rId2">
-            <a:extLst>
-              <a:ext uri="{28A0092B-C50C-407E-A947-70E740481C1C}">
-                <a14:useLocalDpi xmlns:a14="http://schemas.microsoft.com/office/drawing/2010/main" val="0"/>
-              </a:ext>
-            </a:extLst>
-          </a:blip>
-          <a:srcRect/>
-          <a:stretch/>
-        </p:blipFill>
-        <p:spPr>
-          <a:xfrm>
-            <a:off x="2209800" y="1760513"/>
-            <a:ext cx="8128000" cy="5008587"/>
-          </a:xfrm>
-          <a:prstGeom prst="rect">
-            <a:avLst/>
-          </a:prstGeom>
-        </p:spPr>
-      </p:pic>
-      <p:cxnSp>
-        <p:nvCxnSpPr>
-          <p:cNvPr id="6" name="Straight Arrow Connector 5">
-            <a:extLst>
-              <a:ext uri="{FF2B5EF4-FFF2-40B4-BE49-F238E27FC236}">
-                <a16:creationId xmlns:a16="http://schemas.microsoft.com/office/drawing/2014/main" id="{178E06DB-54B0-46A3-8CFC-39CAAD99C7BE}"/>
-              </a:ext>
-            </a:extLst>
-          </p:cNvPr>
-          <p:cNvCxnSpPr>
-            <a:cxnSpLocks/>
-          </p:cNvCxnSpPr>
-          <p:nvPr/>
-        </p:nvCxnSpPr>
-        <p:spPr>
-          <a:xfrm flipV="1">
-            <a:off x="1143000" y="2479278"/>
-            <a:ext cx="965200" cy="419100"/>
-          </a:xfrm>
-          <a:prstGeom prst="straightConnector1">
-            <a:avLst/>
-          </a:prstGeom>
-          <a:ln>
-            <a:tailEnd type="triangle"/>
-          </a:ln>
-        </p:spPr>
-        <p:style>
-          <a:lnRef idx="3">
-            <a:schemeClr val="accent1"/>
-          </a:lnRef>
-          <a:fillRef idx="0">
-            <a:schemeClr val="accent1"/>
-          </a:fillRef>
-          <a:effectRef idx="2">
-            <a:schemeClr val="accent1"/>
-          </a:effectRef>
-          <a:fontRef idx="minor">
-            <a:schemeClr val="tx1"/>
-          </a:fontRef>
-        </p:style>
-      </p:cxnSp>
-    </p:spTree>
-    <p:extLst>
-      <p:ext uri="{BB962C8B-B14F-4D97-AF65-F5344CB8AC3E}">
-        <p14:creationId xmlns:p14="http://schemas.microsoft.com/office/powerpoint/2010/main" val="1326123334"/>
       </p:ext>
     </p:extLst>
   </p:cSld>

</xml_diff>

<commit_message>
samtools error and bioconda channel info added
</commit_message>
<xml_diff>
--- a/cluster_course/powerpoint/7_Conda.pptx
+++ b/cluster_course/powerpoint/7_Conda.pptx
@@ -20,9 +20,10 @@
     <p:sldId id="299" r:id="rId14"/>
     <p:sldId id="297" r:id="rId15"/>
     <p:sldId id="334" r:id="rId16"/>
-    <p:sldId id="331" r:id="rId17"/>
-    <p:sldId id="328" r:id="rId18"/>
-    <p:sldId id="278" r:id="rId19"/>
+    <p:sldId id="335" r:id="rId17"/>
+    <p:sldId id="331" r:id="rId18"/>
+    <p:sldId id="328" r:id="rId19"/>
+    <p:sldId id="278" r:id="rId20"/>
   </p:sldIdLst>
   <p:sldSz cx="12192000" cy="6858000"/>
   <p:notesSz cx="6858000" cy="9144000"/>
@@ -278,7 +279,7 @@
           <a:p>
             <a:fld id="{B1339DB0-78C2-4D45-927F-4D346157740C}" type="datetimeFigureOut">
               <a:rPr lang="en-GB" smtClean="0"/>
-              <a:t>14/02/2019</a:t>
+              <a:t>18/02/2019</a:t>
             </a:fld>
             <a:endParaRPr lang="en-GB"/>
           </a:p>
@@ -478,7 +479,7 @@
           <a:p>
             <a:fld id="{B1339DB0-78C2-4D45-927F-4D346157740C}" type="datetimeFigureOut">
               <a:rPr lang="en-GB" smtClean="0"/>
-              <a:t>14/02/2019</a:t>
+              <a:t>18/02/2019</a:t>
             </a:fld>
             <a:endParaRPr lang="en-GB"/>
           </a:p>
@@ -688,7 +689,7 @@
           <a:p>
             <a:fld id="{B1339DB0-78C2-4D45-927F-4D346157740C}" type="datetimeFigureOut">
               <a:rPr lang="en-GB" smtClean="0"/>
-              <a:t>14/02/2019</a:t>
+              <a:t>18/02/2019</a:t>
             </a:fld>
             <a:endParaRPr lang="en-GB"/>
           </a:p>
@@ -888,7 +889,7 @@
           <a:p>
             <a:fld id="{B1339DB0-78C2-4D45-927F-4D346157740C}" type="datetimeFigureOut">
               <a:rPr lang="en-GB" smtClean="0"/>
-              <a:t>14/02/2019</a:t>
+              <a:t>18/02/2019</a:t>
             </a:fld>
             <a:endParaRPr lang="en-GB"/>
           </a:p>
@@ -1164,7 +1165,7 @@
           <a:p>
             <a:fld id="{B1339DB0-78C2-4D45-927F-4D346157740C}" type="datetimeFigureOut">
               <a:rPr lang="en-GB" smtClean="0"/>
-              <a:t>14/02/2019</a:t>
+              <a:t>18/02/2019</a:t>
             </a:fld>
             <a:endParaRPr lang="en-GB"/>
           </a:p>
@@ -1432,7 +1433,7 @@
           <a:p>
             <a:fld id="{B1339DB0-78C2-4D45-927F-4D346157740C}" type="datetimeFigureOut">
               <a:rPr lang="en-GB" smtClean="0"/>
-              <a:t>14/02/2019</a:t>
+              <a:t>18/02/2019</a:t>
             </a:fld>
             <a:endParaRPr lang="en-GB"/>
           </a:p>
@@ -1847,7 +1848,7 @@
           <a:p>
             <a:fld id="{B1339DB0-78C2-4D45-927F-4D346157740C}" type="datetimeFigureOut">
               <a:rPr lang="en-GB" smtClean="0"/>
-              <a:t>14/02/2019</a:t>
+              <a:t>18/02/2019</a:t>
             </a:fld>
             <a:endParaRPr lang="en-GB"/>
           </a:p>
@@ -1989,7 +1990,7 @@
           <a:p>
             <a:fld id="{B1339DB0-78C2-4D45-927F-4D346157740C}" type="datetimeFigureOut">
               <a:rPr lang="en-GB" smtClean="0"/>
-              <a:t>14/02/2019</a:t>
+              <a:t>18/02/2019</a:t>
             </a:fld>
             <a:endParaRPr lang="en-GB"/>
           </a:p>
@@ -2102,7 +2103,7 @@
           <a:p>
             <a:fld id="{B1339DB0-78C2-4D45-927F-4D346157740C}" type="datetimeFigureOut">
               <a:rPr lang="en-GB" smtClean="0"/>
-              <a:t>14/02/2019</a:t>
+              <a:t>18/02/2019</a:t>
             </a:fld>
             <a:endParaRPr lang="en-GB"/>
           </a:p>
@@ -2415,7 +2416,7 @@
           <a:p>
             <a:fld id="{B1339DB0-78C2-4D45-927F-4D346157740C}" type="datetimeFigureOut">
               <a:rPr lang="en-GB" smtClean="0"/>
-              <a:t>14/02/2019</a:t>
+              <a:t>18/02/2019</a:t>
             </a:fld>
             <a:endParaRPr lang="en-GB"/>
           </a:p>
@@ -2704,7 +2705,7 @@
           <a:p>
             <a:fld id="{B1339DB0-78C2-4D45-927F-4D346157740C}" type="datetimeFigureOut">
               <a:rPr lang="en-GB" smtClean="0"/>
-              <a:t>14/02/2019</a:t>
+              <a:t>18/02/2019</a:t>
             </a:fld>
             <a:endParaRPr lang="en-GB"/>
           </a:p>
@@ -2947,7 +2948,7 @@
           <a:p>
             <a:fld id="{B1339DB0-78C2-4D45-927F-4D346157740C}" type="datetimeFigureOut">
               <a:rPr lang="en-GB" smtClean="0"/>
-              <a:t>14/02/2019</a:t>
+              <a:t>18/02/2019</a:t>
             </a:fld>
             <a:endParaRPr lang="en-GB"/>
           </a:p>
@@ -4841,23 +4842,7 @@
                   <a:srgbClr val="7030A0"/>
                 </a:solidFill>
               </a:rPr>
-              <a:t>7) Conda: Error messages, </a:t>
-            </a:r>
-            <a:r>
-              <a:rPr lang="en-GB" dirty="0" err="1">
-                <a:solidFill>
-                  <a:srgbClr val="7030A0"/>
-                </a:solidFill>
-              </a:rPr>
-              <a:t>qsub</a:t>
-            </a:r>
-            <a:r>
-              <a:rPr lang="en-GB" dirty="0">
-                <a:solidFill>
-                  <a:srgbClr val="7030A0"/>
-                </a:solidFill>
-              </a:rPr>
-              <a:t> temp fix</a:t>
+              <a:t>7) Conda: known error</a:t>
             </a:r>
           </a:p>
         </p:txBody>
@@ -4880,195 +4865,103 @@
         </p:nvSpPr>
         <p:spPr>
           <a:xfrm>
-            <a:off x="342900" y="1532731"/>
-            <a:ext cx="11506200" cy="4351338"/>
+            <a:off x="182880" y="1237956"/>
+            <a:ext cx="12009120" cy="5092505"/>
           </a:xfrm>
         </p:spPr>
         <p:txBody>
           <a:bodyPr>
-            <a:normAutofit fontScale="92500"/>
+            <a:normAutofit fontScale="62500" lnSpcReduction="20000"/>
           </a:bodyPr>
           <a:lstStyle/>
           <a:p>
-            <a:r>
-              <a:rPr lang="en-GB" dirty="0"/>
-              <a:t>Currently if you run </a:t>
-            </a:r>
-            <a:r>
-              <a:rPr lang="en-GB" dirty="0">
-                <a:solidFill>
-                  <a:srgbClr val="0070C0"/>
-                </a:solidFill>
-              </a:rPr>
-              <a:t>module load tool, </a:t>
-            </a:r>
-            <a:r>
-              <a:rPr lang="en-GB" dirty="0"/>
-              <a:t>then use </a:t>
-            </a:r>
-            <a:r>
-              <a:rPr lang="en-GB" dirty="0" err="1">
-                <a:solidFill>
-                  <a:srgbClr val="0070C0"/>
-                </a:solidFill>
-              </a:rPr>
-              <a:t>conda</a:t>
-            </a:r>
-            <a:r>
-              <a:rPr lang="en-GB" dirty="0">
-                <a:solidFill>
-                  <a:srgbClr val="0070C0"/>
-                </a:solidFill>
-              </a:rPr>
-              <a:t> activate </a:t>
-            </a:r>
-            <a:r>
-              <a:rPr lang="en-GB" dirty="0" err="1">
-                <a:solidFill>
-                  <a:srgbClr val="0070C0"/>
-                </a:solidFill>
-              </a:rPr>
-              <a:t>env</a:t>
-            </a:r>
-            <a:endParaRPr lang="en-GB" dirty="0">
-              <a:solidFill>
-                <a:srgbClr val="0070C0"/>
-              </a:solidFill>
-            </a:endParaRPr>
-          </a:p>
-          <a:p>
-            <a:r>
-              <a:rPr lang="en-GB" dirty="0"/>
-              <a:t>This comes back with error messages. </a:t>
-            </a:r>
-          </a:p>
-          <a:p>
-            <a:r>
-              <a:rPr lang="en-GB" dirty="0"/>
-              <a:t>To fix this. Log out and back in again. </a:t>
-            </a:r>
-          </a:p>
-          <a:p>
-            <a:pPr marL="0" indent="0">
-              <a:buNone/>
-            </a:pPr>
-            <a:endParaRPr lang="en-GB" dirty="0"/>
-          </a:p>
-          <a:p>
-            <a:pPr marL="0" indent="0">
-              <a:buNone/>
-            </a:pPr>
-            <a:r>
-              <a:rPr lang="en-GB" b="1" dirty="0" err="1"/>
-              <a:t>qsub</a:t>
-            </a:r>
-            <a:r>
-              <a:rPr lang="en-GB" b="1" dirty="0"/>
-              <a:t> use -V, activate it first</a:t>
-            </a:r>
-          </a:p>
-          <a:p>
-            <a:pPr marL="0" indent="0">
-              <a:buNone/>
-            </a:pPr>
-            <a:r>
-              <a:rPr lang="en-GB" dirty="0"/>
-              <a:t>Remember </a:t>
-            </a:r>
-            <a:r>
-              <a:rPr lang="en-GB" dirty="0" err="1"/>
-              <a:t>qsubbing</a:t>
-            </a:r>
-            <a:r>
-              <a:rPr lang="en-GB" dirty="0"/>
-              <a:t> with a </a:t>
-            </a:r>
             <a:r>
               <a:rPr lang="en-GB" dirty="0" err="1"/>
               <a:t>conda</a:t>
             </a:r>
             <a:r>
               <a:rPr lang="en-GB" dirty="0"/>
-              <a:t> package:</a:t>
-            </a:r>
-          </a:p>
-          <a:p>
-            <a:r>
-              <a:rPr lang="en-GB" dirty="0">
-                <a:solidFill>
-                  <a:srgbClr val="0070C0"/>
-                </a:solidFill>
-              </a:rPr>
-              <a:t>Conda activate </a:t>
-            </a:r>
-            <a:r>
-              <a:rPr lang="en-GB" dirty="0" err="1">
-                <a:solidFill>
-                  <a:srgbClr val="0070C0"/>
-                </a:solidFill>
-              </a:rPr>
-              <a:t>env</a:t>
-            </a:r>
-            <a:endParaRPr lang="en-GB" dirty="0">
-              <a:solidFill>
-                <a:srgbClr val="0070C0"/>
-              </a:solidFill>
-            </a:endParaRPr>
-          </a:p>
-          <a:p>
+              <a:t> and </a:t>
+            </a:r>
+            <a:r>
+              <a:rPr lang="en-GB" dirty="0" err="1"/>
+              <a:t>samtools</a:t>
+            </a:r>
             <a:r>
               <a:rPr lang="en-GB" dirty="0"/>
-              <a:t>then </a:t>
-            </a:r>
-            <a:r>
-              <a:rPr lang="en-GB" dirty="0" err="1">
-                <a:solidFill>
-                  <a:srgbClr val="0070C0"/>
-                </a:solidFill>
-              </a:rPr>
-              <a:t>qsub</a:t>
-            </a:r>
-            <a:r>
-              <a:rPr lang="en-GB" dirty="0">
-                <a:solidFill>
-                  <a:srgbClr val="0070C0"/>
-                </a:solidFill>
-              </a:rPr>
-              <a:t> -V -</a:t>
-            </a:r>
-            <a:r>
-              <a:rPr lang="en-GB" dirty="0" err="1">
-                <a:solidFill>
-                  <a:srgbClr val="0070C0"/>
-                </a:solidFill>
-              </a:rPr>
-              <a:t>pe</a:t>
-            </a:r>
-            <a:r>
-              <a:rPr lang="en-GB" dirty="0">
-                <a:solidFill>
-                  <a:srgbClr val="0070C0"/>
-                </a:solidFill>
-              </a:rPr>
-              <a:t> multi 4 name.sh</a:t>
+              <a:t> problems</a:t>
             </a:r>
           </a:p>
           <a:p>
             <a:r>
               <a:rPr lang="en-GB" dirty="0"/>
-              <a:t>We will fix it so you can add </a:t>
-            </a:r>
+              <a:t>Basically sometimes this get installed from the wrong channel. This may happen with other tools. We haven't come across this yet. </a:t>
+            </a:r>
+          </a:p>
+          <a:p>
+            <a:r>
+              <a:rPr lang="en-GB" dirty="0"/>
+              <a:t>The problem will look like this if you try to use </a:t>
+            </a:r>
+            <a:r>
+              <a:rPr lang="en-GB" dirty="0" err="1"/>
+              <a:t>samtools</a:t>
+            </a:r>
+            <a:r>
+              <a:rPr lang="en-GB" dirty="0"/>
+              <a:t>: </a:t>
+            </a:r>
+          </a:p>
+          <a:p>
+            <a:endParaRPr lang="en-GB" dirty="0"/>
+          </a:p>
+          <a:p>
+            <a:r>
+              <a:rPr lang="en-GB" dirty="0" err="1"/>
+              <a:t>samtools</a:t>
+            </a:r>
+            <a:r>
+              <a:rPr lang="en-GB" dirty="0"/>
+              <a:t>: error while loading shared libraries: libcrypto.so.1.0.0: cannot open shared object file: No such file or directory). </a:t>
+            </a:r>
+          </a:p>
+          <a:p>
+            <a:endParaRPr lang="en-GB" dirty="0"/>
+          </a:p>
+          <a:p>
+            <a:r>
+              <a:rPr lang="en-GB" dirty="0"/>
+              <a:t>install from the </a:t>
+            </a:r>
+            <a:r>
+              <a:rPr lang="en-GB" dirty="0" err="1"/>
+              <a:t>bioconda</a:t>
+            </a:r>
+            <a:r>
+              <a:rPr lang="en-GB" dirty="0"/>
+              <a:t> channel: -c </a:t>
+            </a:r>
+            <a:r>
+              <a:rPr lang="en-GB" dirty="0" err="1"/>
+              <a:t>bioconda</a:t>
+            </a:r>
+            <a:r>
+              <a:rPr lang="en-GB" dirty="0"/>
+              <a:t> </a:t>
+            </a:r>
+          </a:p>
+          <a:p>
             <a:r>
               <a:rPr lang="en-GB" dirty="0" err="1"/>
               <a:t>conda</a:t>
             </a:r>
             <a:r>
               <a:rPr lang="en-GB" dirty="0"/>
-              <a:t> commands to the shell, we </a:t>
+              <a:t> install -c </a:t>
             </a:r>
             <a:r>
               <a:rPr lang="en-GB" dirty="0" err="1"/>
-              <a:t>ar</a:t>
+              <a:t>bioconda</a:t>
             </a:r>
             <a:r>
               <a:rPr lang="en-GB" dirty="0"/>
@@ -5076,32 +4969,213 @@
             </a:r>
             <a:r>
               <a:rPr lang="en-GB" dirty="0" err="1"/>
-              <a:t>enot</a:t>
-            </a:r>
+              <a:t>samtools</a:t>
+            </a:r>
+            <a:endParaRPr lang="en-GB" dirty="0"/>
+          </a:p>
+          <a:p>
             <a:r>
               <a:rPr lang="en-GB" dirty="0"/>
-              <a:t> there yet</a:t>
-            </a:r>
-          </a:p>
-          <a:p>
-            <a:pPr marL="0" indent="0">
-              <a:buNone/>
+              <a:t>or specifically the problem was found with </a:t>
+            </a:r>
+            <a:r>
+              <a:rPr lang="en-GB" dirty="0" err="1"/>
+              <a:t>unicycler</a:t>
+            </a:r>
+            <a:r>
+              <a:rPr lang="en-GB" dirty="0"/>
+              <a:t>: remove the old </a:t>
+            </a:r>
+            <a:r>
+              <a:rPr lang="en-GB" dirty="0" err="1"/>
+              <a:t>unicycler</a:t>
+            </a:r>
+            <a:r>
+              <a:rPr lang="en-GB" dirty="0"/>
+              <a:t> failed install: </a:t>
+            </a:r>
+          </a:p>
+          <a:p>
+            <a:endParaRPr lang="en-GB" dirty="0"/>
+          </a:p>
+          <a:p>
+            <a:r>
+              <a:rPr lang="en-GB" dirty="0" err="1"/>
+              <a:t>conda</a:t>
+            </a:r>
+            <a:r>
+              <a:rPr lang="en-GB" dirty="0"/>
+              <a:t> remove --name </a:t>
+            </a:r>
+            <a:r>
+              <a:rPr lang="en-GB" dirty="0" err="1"/>
+              <a:t>unicyclerENV</a:t>
+            </a:r>
+            <a:r>
+              <a:rPr lang="en-GB" dirty="0"/>
+              <a:t> --all </a:t>
+            </a:r>
+          </a:p>
+          <a:p>
+            <a:endParaRPr lang="en-GB" dirty="0"/>
+          </a:p>
+          <a:p>
+            <a:r>
+              <a:rPr lang="en-GB" dirty="0"/>
+              <a:t>remake this env from the </a:t>
+            </a:r>
+            <a:r>
+              <a:rPr lang="en-GB" dirty="0" err="1"/>
+              <a:t>bioconda</a:t>
+            </a:r>
+            <a:r>
+              <a:rPr lang="en-GB" dirty="0"/>
+              <a:t> channel: </a:t>
+            </a:r>
+          </a:p>
+          <a:p>
+            <a:endParaRPr lang="en-GB" dirty="0"/>
+          </a:p>
+          <a:p>
+            <a:r>
+              <a:rPr lang="en-GB" dirty="0" err="1"/>
+              <a:t>conda</a:t>
+            </a:r>
+            <a:r>
+              <a:rPr lang="en-GB" dirty="0"/>
+              <a:t> create -n </a:t>
+            </a:r>
+            <a:r>
+              <a:rPr lang="en-GB" dirty="0" err="1"/>
+              <a:t>unicyclerENV</a:t>
+            </a:r>
+            <a:r>
+              <a:rPr lang="en-GB" dirty="0"/>
+              <a:t> -c </a:t>
+            </a:r>
+            <a:r>
+              <a:rPr lang="en-GB" dirty="0" err="1"/>
+              <a:t>bioconda</a:t>
+            </a:r>
+            <a:r>
+              <a:rPr lang="en-GB" dirty="0"/>
+              <a:t> </a:t>
+            </a:r>
+            <a:r>
+              <a:rPr lang="en-GB" dirty="0" err="1"/>
+              <a:t>unicycler</a:t>
+            </a:r>
+            <a:endParaRPr lang="en-GB" dirty="0"/>
+          </a:p>
+          <a:p>
+            <a:endParaRPr lang="en-GB" dirty="0"/>
+          </a:p>
+          <a:p>
+            <a:endParaRPr lang="en-GB" dirty="0"/>
+          </a:p>
+          <a:p>
+            <a:endParaRPr lang="en-GB" dirty="0"/>
+          </a:p>
+        </p:txBody>
+      </p:sp>
+      <p:sp>
+        <p:nvSpPr>
+          <p:cNvPr id="5" name="Rectangle 2">
+            <a:extLst>
+              <a:ext uri="{FF2B5EF4-FFF2-40B4-BE49-F238E27FC236}">
+                <a16:creationId xmlns:a16="http://schemas.microsoft.com/office/drawing/2014/main" id="{993566C4-9FDF-4BEE-B011-07A6F2F1AD71}"/>
+              </a:ext>
+            </a:extLst>
+          </p:cNvPr>
+          <p:cNvSpPr>
+            <a:spLocks noChangeArrowheads="1"/>
+          </p:cNvSpPr>
+          <p:nvPr/>
+        </p:nvSpPr>
+        <p:spPr bwMode="auto">
+          <a:xfrm>
+            <a:off x="1322363" y="3645263"/>
+            <a:ext cx="184731" cy="369332"/>
+          </a:xfrm>
+          <a:prstGeom prst="rect">
+            <a:avLst/>
+          </a:prstGeom>
+          <a:noFill/>
+          <a:ln>
+            <a:noFill/>
+          </a:ln>
+          <a:effectLst/>
+          <a:extLst>
+            <a:ext uri="{909E8E84-426E-40DD-AFC4-6F175D3DCCD1}">
+              <a14:hiddenFill xmlns:a14="http://schemas.microsoft.com/office/drawing/2010/main">
+                <a:solidFill>
+                  <a:schemeClr val="accent1"/>
+                </a:solidFill>
+              </a14:hiddenFill>
+            </a:ext>
+            <a:ext uri="{91240B29-F687-4F45-9708-019B960494DF}">
+              <a14:hiddenLine xmlns:a14="http://schemas.microsoft.com/office/drawing/2010/main" w="9525">
+                <a:solidFill>
+                  <a:schemeClr val="tx1"/>
+                </a:solidFill>
+                <a:miter lim="800000"/>
+                <a:headEnd/>
+                <a:tailEnd/>
+              </a14:hiddenLine>
+            </a:ext>
+            <a:ext uri="{AF507438-7753-43E0-B8FC-AC1667EBCBE1}">
+              <a14:hiddenEffects xmlns:a14="http://schemas.microsoft.com/office/drawing/2010/main">
+                <a:effectLst>
+                  <a:outerShdw dist="35921" dir="2700000" algn="ctr" rotWithShape="0">
+                    <a:schemeClr val="bg2"/>
+                  </a:outerShdw>
+                </a:effectLst>
+              </a14:hiddenEffects>
+            </a:ext>
+          </a:extLst>
+        </p:spPr>
+        <p:txBody>
+          <a:bodyPr vert="horz" wrap="none" lIns="91440" tIns="45720" rIns="91440" bIns="45720" numCol="1" anchor="ctr" anchorCtr="0" compatLnSpc="1">
+            <a:prstTxWarp prst="textNoShape">
+              <a:avLst/>
+            </a:prstTxWarp>
+            <a:spAutoFit/>
+          </a:bodyPr>
+          <a:lstStyle/>
+          <a:p>
+            <a:pPr marL="0" marR="0" lvl="0" indent="0" algn="l" defTabSz="914400" rtl="0" eaLnBrk="0" fontAlgn="base" latinLnBrk="0" hangingPunct="0">
+              <a:lnSpc>
+                <a:spcPct val="100000"/>
+              </a:lnSpc>
+              <a:spcBef>
+                <a:spcPct val="0"/>
+              </a:spcBef>
+              <a:spcAft>
+                <a:spcPct val="0"/>
+              </a:spcAft>
+              <a:buClrTx/>
+              <a:buSzTx/>
+              <a:buFontTx/>
+              <a:buNone/>
+              <a:tabLst/>
             </a:pPr>
-            <a:endParaRPr lang="en-GB" dirty="0">
+            <a:endParaRPr kumimoji="0" lang="en-US" altLang="en-US" sz="1800" b="0" i="0" u="none" strike="noStrike" cap="none" normalizeH="0" baseline="0" dirty="0">
+              <a:ln>
+                <a:noFill/>
+              </a:ln>
               <a:solidFill>
-                <a:srgbClr val="0070C0"/>
+                <a:schemeClr val="tx1"/>
               </a:solidFill>
+              <a:effectLst/>
+              <a:latin typeface="Arial" panose="020B0604020202020204" pitchFamily="34" charset="0"/>
             </a:endParaRPr>
-          </a:p>
-          <a:p>
-            <a:endParaRPr lang="en-GB" dirty="0"/>
           </a:p>
         </p:txBody>
       </p:sp>
     </p:spTree>
     <p:extLst>
       <p:ext uri="{BB962C8B-B14F-4D97-AF65-F5344CB8AC3E}">
-        <p14:creationId xmlns:p14="http://schemas.microsoft.com/office/powerpoint/2010/main" val="3543718004"/>
+        <p14:creationId xmlns:p14="http://schemas.microsoft.com/office/powerpoint/2010/main" val="3738827116"/>
       </p:ext>
     </p:extLst>
   </p:cSld>
@@ -5133,6 +5207,325 @@
           <p:cNvPr id="2" name="Title 1">
             <a:extLst>
               <a:ext uri="{FF2B5EF4-FFF2-40B4-BE49-F238E27FC236}">
+                <a16:creationId xmlns:a16="http://schemas.microsoft.com/office/drawing/2014/main" id="{E0E33078-4396-4F2D-9BCD-FF8FF704BF20}"/>
+              </a:ext>
+            </a:extLst>
+          </p:cNvPr>
+          <p:cNvSpPr>
+            <a:spLocks noGrp="1"/>
+          </p:cNvSpPr>
+          <p:nvPr>
+            <p:ph type="title"/>
+          </p:nvPr>
+        </p:nvSpPr>
+        <p:spPr>
+          <a:xfrm>
+            <a:off x="342900" y="0"/>
+            <a:ext cx="11417300" cy="1472406"/>
+          </a:xfrm>
+        </p:spPr>
+        <p:txBody>
+          <a:bodyPr/>
+          <a:lstStyle/>
+          <a:p>
+            <a:r>
+              <a:rPr lang="en-GB" dirty="0">
+                <a:solidFill>
+                  <a:srgbClr val="7030A0"/>
+                </a:solidFill>
+              </a:rPr>
+              <a:t>7) Conda: Error messages, </a:t>
+            </a:r>
+            <a:r>
+              <a:rPr lang="en-GB" dirty="0" err="1">
+                <a:solidFill>
+                  <a:srgbClr val="7030A0"/>
+                </a:solidFill>
+              </a:rPr>
+              <a:t>qsub</a:t>
+            </a:r>
+            <a:r>
+              <a:rPr lang="en-GB" dirty="0">
+                <a:solidFill>
+                  <a:srgbClr val="7030A0"/>
+                </a:solidFill>
+              </a:rPr>
+              <a:t> temp fix</a:t>
+            </a:r>
+          </a:p>
+        </p:txBody>
+      </p:sp>
+      <p:sp>
+        <p:nvSpPr>
+          <p:cNvPr id="3" name="Content Placeholder 2">
+            <a:extLst>
+              <a:ext uri="{FF2B5EF4-FFF2-40B4-BE49-F238E27FC236}">
+                <a16:creationId xmlns:a16="http://schemas.microsoft.com/office/drawing/2014/main" id="{EBD8A9F9-A616-4F33-9309-8311F95B6F9F}"/>
+              </a:ext>
+            </a:extLst>
+          </p:cNvPr>
+          <p:cNvSpPr>
+            <a:spLocks noGrp="1"/>
+          </p:cNvSpPr>
+          <p:nvPr>
+            <p:ph idx="1"/>
+          </p:nvPr>
+        </p:nvSpPr>
+        <p:spPr>
+          <a:xfrm>
+            <a:off x="342900" y="1532731"/>
+            <a:ext cx="11506200" cy="4351338"/>
+          </a:xfrm>
+        </p:spPr>
+        <p:txBody>
+          <a:bodyPr>
+            <a:normAutofit fontScale="92500"/>
+          </a:bodyPr>
+          <a:lstStyle/>
+          <a:p>
+            <a:r>
+              <a:rPr lang="en-GB" dirty="0"/>
+              <a:t>Currently if you run </a:t>
+            </a:r>
+            <a:r>
+              <a:rPr lang="en-GB" dirty="0">
+                <a:solidFill>
+                  <a:srgbClr val="0070C0"/>
+                </a:solidFill>
+              </a:rPr>
+              <a:t>module load tool, </a:t>
+            </a:r>
+            <a:r>
+              <a:rPr lang="en-GB" dirty="0"/>
+              <a:t>then use </a:t>
+            </a:r>
+            <a:r>
+              <a:rPr lang="en-GB" dirty="0" err="1">
+                <a:solidFill>
+                  <a:srgbClr val="0070C0"/>
+                </a:solidFill>
+              </a:rPr>
+              <a:t>conda</a:t>
+            </a:r>
+            <a:r>
+              <a:rPr lang="en-GB" dirty="0">
+                <a:solidFill>
+                  <a:srgbClr val="0070C0"/>
+                </a:solidFill>
+              </a:rPr>
+              <a:t> activate </a:t>
+            </a:r>
+            <a:r>
+              <a:rPr lang="en-GB" dirty="0" err="1">
+                <a:solidFill>
+                  <a:srgbClr val="0070C0"/>
+                </a:solidFill>
+              </a:rPr>
+              <a:t>env</a:t>
+            </a:r>
+            <a:endParaRPr lang="en-GB" dirty="0">
+              <a:solidFill>
+                <a:srgbClr val="0070C0"/>
+              </a:solidFill>
+            </a:endParaRPr>
+          </a:p>
+          <a:p>
+            <a:r>
+              <a:rPr lang="en-GB" dirty="0"/>
+              <a:t>This comes back with error messages. </a:t>
+            </a:r>
+          </a:p>
+          <a:p>
+            <a:r>
+              <a:rPr lang="en-GB" dirty="0"/>
+              <a:t>To fix this. Log out and back in again. </a:t>
+            </a:r>
+          </a:p>
+          <a:p>
+            <a:pPr marL="0" indent="0">
+              <a:buNone/>
+            </a:pPr>
+            <a:endParaRPr lang="en-GB" dirty="0"/>
+          </a:p>
+          <a:p>
+            <a:pPr marL="0" indent="0">
+              <a:buNone/>
+            </a:pPr>
+            <a:r>
+              <a:rPr lang="en-GB" b="1" dirty="0" err="1"/>
+              <a:t>qsub</a:t>
+            </a:r>
+            <a:r>
+              <a:rPr lang="en-GB" b="1" dirty="0"/>
+              <a:t> use -V, activate it first</a:t>
+            </a:r>
+          </a:p>
+          <a:p>
+            <a:pPr marL="0" indent="0">
+              <a:buNone/>
+            </a:pPr>
+            <a:r>
+              <a:rPr lang="en-GB" dirty="0"/>
+              <a:t>Remember </a:t>
+            </a:r>
+            <a:r>
+              <a:rPr lang="en-GB" dirty="0" err="1"/>
+              <a:t>qsubbing</a:t>
+            </a:r>
+            <a:r>
+              <a:rPr lang="en-GB" dirty="0"/>
+              <a:t> with a </a:t>
+            </a:r>
+            <a:r>
+              <a:rPr lang="en-GB" dirty="0" err="1"/>
+              <a:t>conda</a:t>
+            </a:r>
+            <a:r>
+              <a:rPr lang="en-GB" dirty="0"/>
+              <a:t> package:</a:t>
+            </a:r>
+          </a:p>
+          <a:p>
+            <a:r>
+              <a:rPr lang="en-GB" dirty="0">
+                <a:solidFill>
+                  <a:srgbClr val="0070C0"/>
+                </a:solidFill>
+              </a:rPr>
+              <a:t>Conda activate </a:t>
+            </a:r>
+            <a:r>
+              <a:rPr lang="en-GB" dirty="0" err="1">
+                <a:solidFill>
+                  <a:srgbClr val="0070C0"/>
+                </a:solidFill>
+              </a:rPr>
+              <a:t>env</a:t>
+            </a:r>
+            <a:endParaRPr lang="en-GB" dirty="0">
+              <a:solidFill>
+                <a:srgbClr val="0070C0"/>
+              </a:solidFill>
+            </a:endParaRPr>
+          </a:p>
+          <a:p>
+            <a:r>
+              <a:rPr lang="en-GB" dirty="0"/>
+              <a:t>then </a:t>
+            </a:r>
+            <a:r>
+              <a:rPr lang="en-GB" dirty="0" err="1">
+                <a:solidFill>
+                  <a:srgbClr val="0070C0"/>
+                </a:solidFill>
+              </a:rPr>
+              <a:t>qsub</a:t>
+            </a:r>
+            <a:r>
+              <a:rPr lang="en-GB" dirty="0">
+                <a:solidFill>
+                  <a:srgbClr val="0070C0"/>
+                </a:solidFill>
+              </a:rPr>
+              <a:t> -V -</a:t>
+            </a:r>
+            <a:r>
+              <a:rPr lang="en-GB" dirty="0" err="1">
+                <a:solidFill>
+                  <a:srgbClr val="0070C0"/>
+                </a:solidFill>
+              </a:rPr>
+              <a:t>pe</a:t>
+            </a:r>
+            <a:r>
+              <a:rPr lang="en-GB" dirty="0">
+                <a:solidFill>
+                  <a:srgbClr val="0070C0"/>
+                </a:solidFill>
+              </a:rPr>
+              <a:t> multi 4 name.sh</a:t>
+            </a:r>
+          </a:p>
+          <a:p>
+            <a:r>
+              <a:rPr lang="en-GB" dirty="0"/>
+              <a:t>We will fix it so you can add </a:t>
+            </a:r>
+            <a:r>
+              <a:rPr lang="en-GB" dirty="0" err="1"/>
+              <a:t>conda</a:t>
+            </a:r>
+            <a:r>
+              <a:rPr lang="en-GB" dirty="0"/>
+              <a:t> commands to the shell, we </a:t>
+            </a:r>
+            <a:r>
+              <a:rPr lang="en-GB" dirty="0" err="1"/>
+              <a:t>ar</a:t>
+            </a:r>
+            <a:r>
+              <a:rPr lang="en-GB" dirty="0"/>
+              <a:t> </a:t>
+            </a:r>
+            <a:r>
+              <a:rPr lang="en-GB" dirty="0" err="1"/>
+              <a:t>enot</a:t>
+            </a:r>
+            <a:r>
+              <a:rPr lang="en-GB" dirty="0"/>
+              <a:t> there yet</a:t>
+            </a:r>
+          </a:p>
+          <a:p>
+            <a:pPr marL="0" indent="0">
+              <a:buNone/>
+            </a:pPr>
+            <a:endParaRPr lang="en-GB" dirty="0">
+              <a:solidFill>
+                <a:srgbClr val="0070C0"/>
+              </a:solidFill>
+            </a:endParaRPr>
+          </a:p>
+          <a:p>
+            <a:endParaRPr lang="en-GB" dirty="0"/>
+          </a:p>
+        </p:txBody>
+      </p:sp>
+    </p:spTree>
+    <p:extLst>
+      <p:ext uri="{BB962C8B-B14F-4D97-AF65-F5344CB8AC3E}">
+        <p14:creationId xmlns:p14="http://schemas.microsoft.com/office/powerpoint/2010/main" val="3543718004"/>
+      </p:ext>
+    </p:extLst>
+  </p:cSld>
+  <p:clrMapOvr>
+    <a:masterClrMapping/>
+  </p:clrMapOvr>
+</p:sld>
+</file>
+
+<file path=ppt/slides/slide18.xml><?xml version="1.0" encoding="utf-8"?>
+<p:sld xmlns:a="http://schemas.openxmlformats.org/drawingml/2006/main" xmlns:r="http://schemas.openxmlformats.org/officeDocument/2006/relationships" xmlns:p="http://schemas.openxmlformats.org/presentationml/2006/main">
+  <p:cSld>
+    <p:spTree>
+      <p:nvGrpSpPr>
+        <p:cNvPr id="1" name=""/>
+        <p:cNvGrpSpPr/>
+        <p:nvPr/>
+      </p:nvGrpSpPr>
+      <p:grpSpPr>
+        <a:xfrm>
+          <a:off x="0" y="0"/>
+          <a:ext cx="0" cy="0"/>
+          <a:chOff x="0" y="0"/>
+          <a:chExt cx="0" cy="0"/>
+        </a:xfrm>
+      </p:grpSpPr>
+      <p:sp>
+        <p:nvSpPr>
+          <p:cNvPr id="2" name="Title 1">
+            <a:extLst>
+              <a:ext uri="{FF2B5EF4-FFF2-40B4-BE49-F238E27FC236}">
                 <a16:creationId xmlns:a16="http://schemas.microsoft.com/office/drawing/2014/main" id="{94497086-4B64-442A-AD55-9BFF3AFB8878}"/>
               </a:ext>
             </a:extLst>
@@ -5210,7 +5603,7 @@
 </p:sld>
 </file>
 
-<file path=ppt/slides/slide18.xml><?xml version="1.0" encoding="utf-8"?>
+<file path=ppt/slides/slide19.xml><?xml version="1.0" encoding="utf-8"?>
 <p:sld xmlns:a="http://schemas.openxmlformats.org/drawingml/2006/main" xmlns:r="http://schemas.openxmlformats.org/officeDocument/2006/relationships" xmlns:p="http://schemas.openxmlformats.org/presentationml/2006/main">
   <p:cSld>
     <p:spTree>

</xml_diff>